<commit_message>
Tasks and slides are updated
</commit_message>
<xml_diff>
--- a/assets/diagrams.pptx
+++ b/assets/diagrams.pptx
@@ -5,10 +5,10 @@
     <p:sldMasterId id="2147483648" r:id="rId1"/>
   </p:sldMasterIdLst>
   <p:notesMasterIdLst>
-    <p:notesMasterId r:id="rId13"/>
+    <p:notesMasterId r:id="rId22"/>
   </p:notesMasterIdLst>
   <p:handoutMasterIdLst>
-    <p:handoutMasterId r:id="rId14"/>
+    <p:handoutMasterId r:id="rId23"/>
   </p:handoutMasterIdLst>
   <p:sldIdLst>
     <p:sldId id="256" r:id="rId2"/>
@@ -22,6 +22,15 @@
     <p:sldId id="260" r:id="rId10"/>
     <p:sldId id="263" r:id="rId11"/>
     <p:sldId id="264" r:id="rId12"/>
+    <p:sldId id="270" r:id="rId13"/>
+    <p:sldId id="280" r:id="rId14"/>
+    <p:sldId id="279" r:id="rId15"/>
+    <p:sldId id="271" r:id="rId16"/>
+    <p:sldId id="273" r:id="rId17"/>
+    <p:sldId id="277" r:id="rId18"/>
+    <p:sldId id="276" r:id="rId19"/>
+    <p:sldId id="274" r:id="rId20"/>
+    <p:sldId id="278" r:id="rId21"/>
   </p:sldIdLst>
   <p:sldSz cx="9144000" cy="6858000" type="screen4x3"/>
   <p:notesSz cx="6858000" cy="9144000"/>
@@ -240,7 +249,7 @@
           <a:p>
             <a:fld id="{CE3BC3F9-9C5B-4717-9F59-36DC790402FE}" type="datetimeFigureOut">
               <a:rPr lang="ru-RU" smtClean="0"/>
-              <a:t>16.12.2018</a:t>
+              <a:t>09.07.2019</a:t>
             </a:fld>
             <a:endParaRPr lang="ru-RU"/>
           </a:p>
@@ -405,7 +414,7 @@
           <a:p>
             <a:fld id="{A20A133F-8031-4831-8F3E-50C91F823C86}" type="datetimeFigureOut">
               <a:rPr lang="ru-RU" smtClean="0"/>
-              <a:t>16.12.2018</a:t>
+              <a:t>09.07.2019</a:t>
             </a:fld>
             <a:endParaRPr lang="ru-RU"/>
           </a:p>
@@ -6133,6 +6142,2955 @@
 </p:sld>
 </file>
 
+<file path=ppt/slides/slide12.xml><?xml version="1.0" encoding="utf-8"?>
+<p:sld xmlns:a="http://schemas.openxmlformats.org/drawingml/2006/main" xmlns:r="http://schemas.openxmlformats.org/officeDocument/2006/relationships" xmlns:p="http://schemas.openxmlformats.org/presentationml/2006/main">
+  <p:cSld>
+    <p:bg>
+      <p:bgPr>
+        <a:solidFill>
+          <a:schemeClr val="tx1"/>
+        </a:solidFill>
+        <a:effectLst/>
+      </p:bgPr>
+    </p:bg>
+    <p:spTree>
+      <p:nvGrpSpPr>
+        <p:cNvPr id="1" name=""/>
+        <p:cNvGrpSpPr/>
+        <p:nvPr/>
+      </p:nvGrpSpPr>
+      <p:grpSpPr>
+        <a:xfrm>
+          <a:off x="0" y="0"/>
+          <a:ext cx="0" cy="0"/>
+          <a:chOff x="0" y="0"/>
+          <a:chExt cx="0" cy="0"/>
+        </a:xfrm>
+      </p:grpSpPr>
+      <p:sp>
+        <p:nvSpPr>
+          <p:cNvPr id="2" name="Прямоугольник 1"/>
+          <p:cNvSpPr/>
+          <p:nvPr/>
+        </p:nvSpPr>
+        <p:spPr>
+          <a:xfrm>
+            <a:off x="0" y="0"/>
+            <a:ext cx="9144000" cy="1815882"/>
+          </a:xfrm>
+          <a:prstGeom prst="rect">
+            <a:avLst/>
+          </a:prstGeom>
+          <a:solidFill>
+            <a:schemeClr val="bg1"/>
+          </a:solidFill>
+        </p:spPr>
+        <p:txBody>
+          <a:bodyPr wrap="square">
+            <a:spAutoFit/>
+          </a:bodyPr>
+          <a:lstStyle/>
+          <a:p>
+            <a:r>
+              <a:rPr lang="en-US" sz="2800" b="1" dirty="0" smtClean="0">
+                <a:solidFill>
+                  <a:schemeClr val="bg1"/>
+                </a:solidFill>
+                <a:latin typeface="Consolas" panose="020B0609020204030204" pitchFamily="49" charset="0"/>
+              </a:rPr>
+              <a:t>|</a:t>
+            </a:r>
+            <a:r>
+              <a:rPr lang="en-US" b="1" dirty="0" smtClean="0">
+                <a:solidFill>
+                  <a:srgbClr val="000080"/>
+                </a:solidFill>
+                <a:latin typeface="Consolas" panose="020B0609020204030204" pitchFamily="49" charset="0"/>
+              </a:rPr>
+              <a:t>let</a:t>
+            </a:r>
+            <a:r>
+              <a:rPr lang="en-US" dirty="0" smtClean="0">
+                <a:solidFill>
+                  <a:srgbClr val="000000"/>
+                </a:solidFill>
+                <a:latin typeface="Consolas" panose="020B0609020204030204" pitchFamily="49" charset="0"/>
+              </a:rPr>
+              <a:t> </a:t>
+            </a:r>
+            <a:r>
+              <a:rPr lang="en-US" dirty="0">
+                <a:solidFill>
+                  <a:srgbClr val="000000"/>
+                </a:solidFill>
+                <a:latin typeface="Consolas" panose="020B0609020204030204" pitchFamily="49" charset="0"/>
+              </a:rPr>
+              <a:t>people = </a:t>
+            </a:r>
+            <a:r>
+              <a:rPr lang="en-US" dirty="0" smtClean="0">
+                <a:solidFill>
+                  <a:srgbClr val="000000"/>
+                </a:solidFill>
+                <a:latin typeface="Consolas" panose="020B0609020204030204" pitchFamily="49" charset="0"/>
+              </a:rPr>
+              <a:t>[</a:t>
+            </a:r>
+          </a:p>
+          <a:p>
+            <a:r>
+              <a:rPr lang="en-US" sz="2800" b="1" dirty="0">
+                <a:solidFill>
+                  <a:schemeClr val="bg1"/>
+                </a:solidFill>
+                <a:latin typeface="Consolas" panose="020B0609020204030204" pitchFamily="49" charset="0"/>
+              </a:rPr>
+              <a:t>|</a:t>
+            </a:r>
+            <a:r>
+              <a:rPr lang="en-US" dirty="0" smtClean="0">
+                <a:solidFill>
+                  <a:srgbClr val="000000"/>
+                </a:solidFill>
+                <a:latin typeface="Consolas" panose="020B0609020204030204" pitchFamily="49" charset="0"/>
+              </a:rPr>
+              <a:t>   { </a:t>
+            </a:r>
+            <a:r>
+              <a:rPr lang="en-US" dirty="0">
+                <a:solidFill>
+                  <a:srgbClr val="000000"/>
+                </a:solidFill>
+                <a:latin typeface="Consolas" panose="020B0609020204030204" pitchFamily="49" charset="0"/>
+              </a:rPr>
+              <a:t>names: { surname: </a:t>
+            </a:r>
+            <a:r>
+              <a:rPr lang="en-US" b="1" dirty="0">
+                <a:solidFill>
+                  <a:srgbClr val="008000"/>
+                </a:solidFill>
+                <a:latin typeface="Consolas" panose="020B0609020204030204" pitchFamily="49" charset="0"/>
+              </a:rPr>
+              <a:t>'Westlake'</a:t>
+            </a:r>
+            <a:r>
+              <a:rPr lang="en-US" dirty="0">
+                <a:solidFill>
+                  <a:srgbClr val="000000"/>
+                </a:solidFill>
+                <a:latin typeface="Consolas" panose="020B0609020204030204" pitchFamily="49" charset="0"/>
+              </a:rPr>
+              <a:t>, name: </a:t>
+            </a:r>
+            <a:r>
+              <a:rPr lang="en-US" b="1" dirty="0">
+                <a:solidFill>
+                  <a:srgbClr val="008000"/>
+                </a:solidFill>
+                <a:latin typeface="Consolas" panose="020B0609020204030204" pitchFamily="49" charset="0"/>
+              </a:rPr>
+              <a:t>'Ronald'</a:t>
+            </a:r>
+            <a:r>
+              <a:rPr lang="en-US" dirty="0">
+                <a:solidFill>
+                  <a:srgbClr val="000000"/>
+                </a:solidFill>
+                <a:latin typeface="Consolas" panose="020B0609020204030204" pitchFamily="49" charset="0"/>
+              </a:rPr>
+              <a:t> }, age: </a:t>
+            </a:r>
+            <a:r>
+              <a:rPr lang="en-US" dirty="0">
+                <a:solidFill>
+                  <a:srgbClr val="0000FF"/>
+                </a:solidFill>
+                <a:latin typeface="Consolas" panose="020B0609020204030204" pitchFamily="49" charset="0"/>
+              </a:rPr>
+              <a:t>42</a:t>
+            </a:r>
+            <a:r>
+              <a:rPr lang="en-US" dirty="0">
+                <a:solidFill>
+                  <a:srgbClr val="000000"/>
+                </a:solidFill>
+                <a:latin typeface="Consolas" panose="020B0609020204030204" pitchFamily="49" charset="0"/>
+              </a:rPr>
+              <a:t> </a:t>
+            </a:r>
+            <a:r>
+              <a:rPr lang="en-US" dirty="0" smtClean="0">
+                <a:solidFill>
+                  <a:srgbClr val="000000"/>
+                </a:solidFill>
+                <a:latin typeface="Consolas" panose="020B0609020204030204" pitchFamily="49" charset="0"/>
+              </a:rPr>
+              <a:t>},</a:t>
+            </a:r>
+          </a:p>
+          <a:p>
+            <a:r>
+              <a:rPr lang="en-US" sz="2800" b="1" dirty="0">
+                <a:solidFill>
+                  <a:schemeClr val="bg1"/>
+                </a:solidFill>
+                <a:latin typeface="Consolas" panose="020B0609020204030204" pitchFamily="49" charset="0"/>
+              </a:rPr>
+              <a:t>|</a:t>
+            </a:r>
+            <a:r>
+              <a:rPr lang="en-US" dirty="0" smtClean="0">
+                <a:solidFill>
+                  <a:srgbClr val="000000"/>
+                </a:solidFill>
+                <a:latin typeface="Consolas" panose="020B0609020204030204" pitchFamily="49" charset="0"/>
+              </a:rPr>
+              <a:t>   { </a:t>
+            </a:r>
+            <a:r>
+              <a:rPr lang="en-US" dirty="0">
+                <a:solidFill>
+                  <a:srgbClr val="000000"/>
+                </a:solidFill>
+                <a:latin typeface="Consolas" panose="020B0609020204030204" pitchFamily="49" charset="0"/>
+              </a:rPr>
+              <a:t>names: { surname: </a:t>
+            </a:r>
+            <a:r>
+              <a:rPr lang="en-US" b="1" dirty="0">
+                <a:solidFill>
+                  <a:srgbClr val="008000"/>
+                </a:solidFill>
+                <a:latin typeface="Consolas" panose="020B0609020204030204" pitchFamily="49" charset="0"/>
+              </a:rPr>
+              <a:t>'Ace'</a:t>
+            </a:r>
+            <a:r>
+              <a:rPr lang="en-US" dirty="0">
+                <a:solidFill>
+                  <a:srgbClr val="000000"/>
+                </a:solidFill>
+                <a:latin typeface="Consolas" panose="020B0609020204030204" pitchFamily="49" charset="0"/>
+              </a:rPr>
+              <a:t>, name: </a:t>
+            </a:r>
+            <a:r>
+              <a:rPr lang="en-US" b="1" dirty="0">
+                <a:solidFill>
+                  <a:srgbClr val="008000"/>
+                </a:solidFill>
+                <a:latin typeface="Consolas" panose="020B0609020204030204" pitchFamily="49" charset="0"/>
+              </a:rPr>
+              <a:t>'Frederic'</a:t>
+            </a:r>
+            <a:r>
+              <a:rPr lang="en-US" dirty="0">
+                <a:solidFill>
+                  <a:srgbClr val="000000"/>
+                </a:solidFill>
+                <a:latin typeface="Consolas" panose="020B0609020204030204" pitchFamily="49" charset="0"/>
+              </a:rPr>
+              <a:t> }, age: </a:t>
+            </a:r>
+            <a:r>
+              <a:rPr lang="en-US" dirty="0">
+                <a:solidFill>
+                  <a:srgbClr val="0000FF"/>
+                </a:solidFill>
+                <a:latin typeface="Consolas" panose="020B0609020204030204" pitchFamily="49" charset="0"/>
+              </a:rPr>
+              <a:t>26</a:t>
+            </a:r>
+            <a:r>
+              <a:rPr lang="en-US" dirty="0">
+                <a:solidFill>
+                  <a:srgbClr val="000000"/>
+                </a:solidFill>
+                <a:latin typeface="Consolas" panose="020B0609020204030204" pitchFamily="49" charset="0"/>
+              </a:rPr>
+              <a:t> </a:t>
+            </a:r>
+            <a:r>
+              <a:rPr lang="en-US" dirty="0" smtClean="0">
+                <a:solidFill>
+                  <a:srgbClr val="000000"/>
+                </a:solidFill>
+                <a:latin typeface="Consolas" panose="020B0609020204030204" pitchFamily="49" charset="0"/>
+              </a:rPr>
+              <a:t>}</a:t>
+            </a:r>
+          </a:p>
+          <a:p>
+            <a:r>
+              <a:rPr lang="en-US" sz="2800" b="1" dirty="0">
+                <a:solidFill>
+                  <a:schemeClr val="bg1"/>
+                </a:solidFill>
+                <a:latin typeface="Consolas" panose="020B0609020204030204" pitchFamily="49" charset="0"/>
+              </a:rPr>
+              <a:t>|</a:t>
+            </a:r>
+            <a:r>
+              <a:rPr lang="en-US" dirty="0" smtClean="0">
+                <a:solidFill>
+                  <a:srgbClr val="000000"/>
+                </a:solidFill>
+                <a:latin typeface="Consolas" panose="020B0609020204030204" pitchFamily="49" charset="0"/>
+              </a:rPr>
+              <a:t>];</a:t>
+            </a:r>
+            <a:endParaRPr lang="ru-RU" dirty="0"/>
+          </a:p>
+        </p:txBody>
+      </p:sp>
+    </p:spTree>
+    <p:extLst>
+      <p:ext uri="{BB962C8B-B14F-4D97-AF65-F5344CB8AC3E}">
+        <p14:creationId xmlns:p14="http://schemas.microsoft.com/office/powerpoint/2010/main" val="2668822737"/>
+      </p:ext>
+    </p:extLst>
+  </p:cSld>
+  <p:clrMapOvr>
+    <a:masterClrMapping/>
+  </p:clrMapOvr>
+</p:sld>
+</file>
+
+<file path=ppt/slides/slide13.xml><?xml version="1.0" encoding="utf-8"?>
+<p:sld xmlns:a="http://schemas.openxmlformats.org/drawingml/2006/main" xmlns:r="http://schemas.openxmlformats.org/officeDocument/2006/relationships" xmlns:p="http://schemas.openxmlformats.org/presentationml/2006/main">
+  <p:cSld>
+    <p:bg>
+      <p:bgPr>
+        <a:solidFill>
+          <a:schemeClr val="tx1"/>
+        </a:solidFill>
+        <a:effectLst/>
+      </p:bgPr>
+    </p:bg>
+    <p:spTree>
+      <p:nvGrpSpPr>
+        <p:cNvPr id="1" name=""/>
+        <p:cNvGrpSpPr/>
+        <p:nvPr/>
+      </p:nvGrpSpPr>
+      <p:grpSpPr>
+        <a:xfrm>
+          <a:off x="0" y="0"/>
+          <a:ext cx="0" cy="0"/>
+          <a:chOff x="0" y="0"/>
+          <a:chExt cx="0" cy="0"/>
+        </a:xfrm>
+      </p:grpSpPr>
+      <p:sp>
+        <p:nvSpPr>
+          <p:cNvPr id="3" name="Прямоугольник 2"/>
+          <p:cNvSpPr/>
+          <p:nvPr/>
+        </p:nvSpPr>
+        <p:spPr>
+          <a:xfrm>
+            <a:off x="0" y="0"/>
+            <a:ext cx="9144000" cy="1815882"/>
+          </a:xfrm>
+          <a:prstGeom prst="rect">
+            <a:avLst/>
+          </a:prstGeom>
+          <a:solidFill>
+            <a:schemeClr val="bg1"/>
+          </a:solidFill>
+        </p:spPr>
+        <p:txBody>
+          <a:bodyPr wrap="square">
+            <a:spAutoFit/>
+          </a:bodyPr>
+          <a:lstStyle/>
+          <a:p>
+            <a:r>
+              <a:rPr lang="en-US" sz="2800" b="1" dirty="0" smtClean="0">
+                <a:solidFill>
+                  <a:schemeClr val="bg1"/>
+                </a:solidFill>
+                <a:latin typeface="Consolas" panose="020B0609020204030204" pitchFamily="49" charset="0"/>
+              </a:rPr>
+              <a:t>|</a:t>
+            </a:r>
+            <a:r>
+              <a:rPr lang="en-US" b="1" dirty="0" smtClean="0">
+                <a:solidFill>
+                  <a:srgbClr val="000080"/>
+                </a:solidFill>
+                <a:latin typeface="Consolas" panose="020B0609020204030204" pitchFamily="49" charset="0"/>
+              </a:rPr>
+              <a:t>let</a:t>
+            </a:r>
+            <a:r>
+              <a:rPr lang="en-US" dirty="0" smtClean="0">
+                <a:solidFill>
+                  <a:srgbClr val="000000"/>
+                </a:solidFill>
+                <a:latin typeface="Consolas" panose="020B0609020204030204" pitchFamily="49" charset="0"/>
+              </a:rPr>
+              <a:t> people = </a:t>
+            </a:r>
+            <a:r>
+              <a:rPr lang="en-US" sz="2800" b="1" dirty="0" smtClean="0">
+                <a:solidFill>
+                  <a:srgbClr val="000000"/>
+                </a:solidFill>
+                <a:latin typeface="Consolas" panose="020B0609020204030204" pitchFamily="49" charset="0"/>
+              </a:rPr>
+              <a:t>[</a:t>
+            </a:r>
+            <a:endParaRPr lang="en-US" b="1" dirty="0" smtClean="0">
+              <a:solidFill>
+                <a:srgbClr val="000000"/>
+              </a:solidFill>
+              <a:latin typeface="Consolas" panose="020B0609020204030204" pitchFamily="49" charset="0"/>
+            </a:endParaRPr>
+          </a:p>
+          <a:p>
+            <a:r>
+              <a:rPr lang="en-US" sz="2800" dirty="0" smtClean="0">
+                <a:solidFill>
+                  <a:schemeClr val="bg1"/>
+                </a:solidFill>
+                <a:latin typeface="Consolas" panose="020B0609020204030204" pitchFamily="49" charset="0"/>
+              </a:rPr>
+              <a:t>|</a:t>
+            </a:r>
+            <a:r>
+              <a:rPr lang="en-US" dirty="0" smtClean="0">
+                <a:solidFill>
+                  <a:srgbClr val="000000"/>
+                </a:solidFill>
+                <a:latin typeface="Consolas" panose="020B0609020204030204" pitchFamily="49" charset="0"/>
+              </a:rPr>
+              <a:t>    </a:t>
+            </a:r>
+            <a:r>
+              <a:rPr lang="en-US" dirty="0" smtClean="0">
+                <a:solidFill>
+                  <a:srgbClr val="000000"/>
+                </a:solidFill>
+                <a:latin typeface="Consolas" panose="020B0609020204030204" pitchFamily="49" charset="0"/>
+              </a:rPr>
+              <a:t>{ </a:t>
+            </a:r>
+            <a:r>
+              <a:rPr lang="en-US" dirty="0">
+                <a:solidFill>
+                  <a:srgbClr val="000000"/>
+                </a:solidFill>
+                <a:latin typeface="Consolas" panose="020B0609020204030204" pitchFamily="49" charset="0"/>
+              </a:rPr>
+              <a:t>names: { surname: </a:t>
+            </a:r>
+            <a:r>
+              <a:rPr lang="en-US" b="1" dirty="0">
+                <a:solidFill>
+                  <a:srgbClr val="008000"/>
+                </a:solidFill>
+                <a:latin typeface="Consolas" panose="020B0609020204030204" pitchFamily="49" charset="0"/>
+              </a:rPr>
+              <a:t>'Westlake'</a:t>
+            </a:r>
+            <a:r>
+              <a:rPr lang="en-US" dirty="0">
+                <a:solidFill>
+                  <a:srgbClr val="000000"/>
+                </a:solidFill>
+                <a:latin typeface="Consolas" panose="020B0609020204030204" pitchFamily="49" charset="0"/>
+              </a:rPr>
+              <a:t>, name: </a:t>
+            </a:r>
+            <a:r>
+              <a:rPr lang="en-US" b="1" dirty="0">
+                <a:solidFill>
+                  <a:srgbClr val="008000"/>
+                </a:solidFill>
+                <a:latin typeface="Consolas" panose="020B0609020204030204" pitchFamily="49" charset="0"/>
+              </a:rPr>
+              <a:t>'Ronald'</a:t>
+            </a:r>
+            <a:r>
+              <a:rPr lang="en-US" dirty="0">
+                <a:solidFill>
+                  <a:srgbClr val="000000"/>
+                </a:solidFill>
+                <a:latin typeface="Consolas" panose="020B0609020204030204" pitchFamily="49" charset="0"/>
+              </a:rPr>
+              <a:t> }, age: </a:t>
+            </a:r>
+            <a:r>
+              <a:rPr lang="en-US" dirty="0">
+                <a:solidFill>
+                  <a:srgbClr val="0000FF"/>
+                </a:solidFill>
+                <a:latin typeface="Consolas" panose="020B0609020204030204" pitchFamily="49" charset="0"/>
+              </a:rPr>
+              <a:t>42</a:t>
+            </a:r>
+            <a:r>
+              <a:rPr lang="en-US" dirty="0">
+                <a:solidFill>
+                  <a:srgbClr val="000000"/>
+                </a:solidFill>
+                <a:latin typeface="Consolas" panose="020B0609020204030204" pitchFamily="49" charset="0"/>
+              </a:rPr>
+              <a:t> </a:t>
+            </a:r>
+            <a:r>
+              <a:rPr lang="en-US" dirty="0" smtClean="0">
+                <a:solidFill>
+                  <a:srgbClr val="000000"/>
+                </a:solidFill>
+                <a:latin typeface="Consolas" panose="020B0609020204030204" pitchFamily="49" charset="0"/>
+              </a:rPr>
+              <a:t>},</a:t>
+            </a:r>
+          </a:p>
+          <a:p>
+            <a:r>
+              <a:rPr lang="en-US" sz="2800" dirty="0">
+                <a:solidFill>
+                  <a:schemeClr val="bg1"/>
+                </a:solidFill>
+                <a:latin typeface="Consolas" panose="020B0609020204030204" pitchFamily="49" charset="0"/>
+              </a:rPr>
+              <a:t>|</a:t>
+            </a:r>
+            <a:r>
+              <a:rPr lang="en-US" dirty="0" smtClean="0">
+                <a:solidFill>
+                  <a:srgbClr val="000000"/>
+                </a:solidFill>
+                <a:latin typeface="Consolas" panose="020B0609020204030204" pitchFamily="49" charset="0"/>
+              </a:rPr>
+              <a:t>    </a:t>
+            </a:r>
+            <a:r>
+              <a:rPr lang="en-US" sz="2800" b="1" dirty="0" smtClean="0">
+                <a:solidFill>
+                  <a:srgbClr val="000000"/>
+                </a:solidFill>
+                <a:latin typeface="Consolas" panose="020B0609020204030204" pitchFamily="49" charset="0"/>
+              </a:rPr>
+              <a:t>{</a:t>
+            </a:r>
+            <a:r>
+              <a:rPr lang="en-US" dirty="0" smtClean="0">
+                <a:solidFill>
+                  <a:srgbClr val="000000"/>
+                </a:solidFill>
+                <a:latin typeface="Consolas" panose="020B0609020204030204" pitchFamily="49" charset="0"/>
+              </a:rPr>
+              <a:t> </a:t>
+            </a:r>
+            <a:r>
+              <a:rPr lang="en-US" dirty="0">
+                <a:solidFill>
+                  <a:srgbClr val="000000"/>
+                </a:solidFill>
+                <a:latin typeface="Consolas" panose="020B0609020204030204" pitchFamily="49" charset="0"/>
+              </a:rPr>
+              <a:t>names: </a:t>
+            </a:r>
+            <a:r>
+              <a:rPr lang="en-US" sz="2800" b="1" dirty="0">
+                <a:solidFill>
+                  <a:srgbClr val="000000"/>
+                </a:solidFill>
+                <a:latin typeface="Consolas" panose="020B0609020204030204" pitchFamily="49" charset="0"/>
+              </a:rPr>
+              <a:t>{</a:t>
+            </a:r>
+            <a:r>
+              <a:rPr lang="en-US" dirty="0">
+                <a:solidFill>
+                  <a:srgbClr val="000000"/>
+                </a:solidFill>
+                <a:latin typeface="Consolas" panose="020B0609020204030204" pitchFamily="49" charset="0"/>
+              </a:rPr>
+              <a:t> surname: </a:t>
+            </a:r>
+            <a:r>
+              <a:rPr lang="en-US" sz="2800" b="1" dirty="0" smtClean="0">
+                <a:solidFill>
+                  <a:srgbClr val="008000"/>
+                </a:solidFill>
+                <a:latin typeface="Consolas" panose="020B0609020204030204" pitchFamily="49" charset="0"/>
+              </a:rPr>
+              <a:t>'Potter'</a:t>
+            </a:r>
+            <a:r>
+              <a:rPr lang="en-US" dirty="0" smtClean="0">
+                <a:solidFill>
+                  <a:srgbClr val="000000"/>
+                </a:solidFill>
+                <a:latin typeface="Consolas" panose="020B0609020204030204" pitchFamily="49" charset="0"/>
+              </a:rPr>
+              <a:t>, </a:t>
+            </a:r>
+            <a:r>
+              <a:rPr lang="en-US" dirty="0">
+                <a:solidFill>
+                  <a:srgbClr val="000000"/>
+                </a:solidFill>
+                <a:latin typeface="Consolas" panose="020B0609020204030204" pitchFamily="49" charset="0"/>
+              </a:rPr>
+              <a:t>name: </a:t>
+            </a:r>
+            <a:r>
+              <a:rPr lang="en-US" b="1" dirty="0">
+                <a:solidFill>
+                  <a:srgbClr val="008000"/>
+                </a:solidFill>
+                <a:latin typeface="Consolas" panose="020B0609020204030204" pitchFamily="49" charset="0"/>
+              </a:rPr>
+              <a:t>'Frederic'</a:t>
+            </a:r>
+            <a:r>
+              <a:rPr lang="en-US" dirty="0">
+                <a:solidFill>
+                  <a:srgbClr val="000000"/>
+                </a:solidFill>
+                <a:latin typeface="Consolas" panose="020B0609020204030204" pitchFamily="49" charset="0"/>
+              </a:rPr>
+              <a:t> </a:t>
+            </a:r>
+            <a:r>
+              <a:rPr lang="en-US" sz="2800" b="1" dirty="0">
+                <a:solidFill>
+                  <a:srgbClr val="000000"/>
+                </a:solidFill>
+                <a:latin typeface="Consolas" panose="020B0609020204030204" pitchFamily="49" charset="0"/>
+              </a:rPr>
+              <a:t>}</a:t>
+            </a:r>
+            <a:r>
+              <a:rPr lang="en-US" dirty="0">
+                <a:solidFill>
+                  <a:srgbClr val="000000"/>
+                </a:solidFill>
+                <a:latin typeface="Consolas" panose="020B0609020204030204" pitchFamily="49" charset="0"/>
+              </a:rPr>
+              <a:t>, age: </a:t>
+            </a:r>
+            <a:r>
+              <a:rPr lang="en-US" dirty="0">
+                <a:solidFill>
+                  <a:srgbClr val="0000FF"/>
+                </a:solidFill>
+                <a:latin typeface="Consolas" panose="020B0609020204030204" pitchFamily="49" charset="0"/>
+              </a:rPr>
+              <a:t>26</a:t>
+            </a:r>
+            <a:r>
+              <a:rPr lang="en-US" dirty="0">
+                <a:solidFill>
+                  <a:srgbClr val="000000"/>
+                </a:solidFill>
+                <a:latin typeface="Consolas" panose="020B0609020204030204" pitchFamily="49" charset="0"/>
+              </a:rPr>
+              <a:t> </a:t>
+            </a:r>
+            <a:r>
+              <a:rPr lang="en-US" sz="2800" b="1" dirty="0" smtClean="0">
+                <a:solidFill>
+                  <a:srgbClr val="000000"/>
+                </a:solidFill>
+                <a:latin typeface="Consolas" panose="020B0609020204030204" pitchFamily="49" charset="0"/>
+              </a:rPr>
+              <a:t>}</a:t>
+            </a:r>
+            <a:endParaRPr lang="en-US" b="1" dirty="0" smtClean="0">
+              <a:solidFill>
+                <a:srgbClr val="000000"/>
+              </a:solidFill>
+              <a:latin typeface="Consolas" panose="020B0609020204030204" pitchFamily="49" charset="0"/>
+            </a:endParaRPr>
+          </a:p>
+          <a:p>
+            <a:r>
+              <a:rPr lang="en-US" sz="2800" dirty="0" smtClean="0">
+                <a:solidFill>
+                  <a:schemeClr val="bg1"/>
+                </a:solidFill>
+                <a:latin typeface="Consolas" panose="020B0609020204030204" pitchFamily="49" charset="0"/>
+              </a:rPr>
+              <a:t>|</a:t>
+            </a:r>
+            <a:r>
+              <a:rPr lang="en-US" sz="2800" b="1" dirty="0" smtClean="0">
+                <a:solidFill>
+                  <a:srgbClr val="000000"/>
+                </a:solidFill>
+                <a:latin typeface="Consolas" panose="020B0609020204030204" pitchFamily="49" charset="0"/>
+              </a:rPr>
+              <a:t>]</a:t>
+            </a:r>
+            <a:r>
+              <a:rPr lang="en-US" dirty="0" smtClean="0">
+                <a:solidFill>
+                  <a:srgbClr val="000000"/>
+                </a:solidFill>
+                <a:latin typeface="Consolas" panose="020B0609020204030204" pitchFamily="49" charset="0"/>
+              </a:rPr>
+              <a:t>;</a:t>
+            </a:r>
+            <a:endParaRPr lang="ru-RU" dirty="0"/>
+          </a:p>
+        </p:txBody>
+      </p:sp>
+    </p:spTree>
+    <p:extLst>
+      <p:ext uri="{BB962C8B-B14F-4D97-AF65-F5344CB8AC3E}">
+        <p14:creationId xmlns:p14="http://schemas.microsoft.com/office/powerpoint/2010/main" val="4111382249"/>
+      </p:ext>
+    </p:extLst>
+  </p:cSld>
+  <p:clrMapOvr>
+    <a:masterClrMapping/>
+  </p:clrMapOvr>
+</p:sld>
+</file>
+
+<file path=ppt/slides/slide14.xml><?xml version="1.0" encoding="utf-8"?>
+<p:sld xmlns:a="http://schemas.openxmlformats.org/drawingml/2006/main" xmlns:r="http://schemas.openxmlformats.org/officeDocument/2006/relationships" xmlns:p="http://schemas.openxmlformats.org/presentationml/2006/main">
+  <p:cSld>
+    <p:spTree>
+      <p:nvGrpSpPr>
+        <p:cNvPr id="1" name=""/>
+        <p:cNvGrpSpPr/>
+        <p:nvPr/>
+      </p:nvGrpSpPr>
+      <p:grpSpPr>
+        <a:xfrm>
+          <a:off x="0" y="0"/>
+          <a:ext cx="0" cy="0"/>
+          <a:chOff x="0" y="0"/>
+          <a:chExt cx="0" cy="0"/>
+        </a:xfrm>
+      </p:grpSpPr>
+      <p:sp>
+        <p:nvSpPr>
+          <p:cNvPr id="3" name="Прямоугольник 2"/>
+          <p:cNvSpPr/>
+          <p:nvPr/>
+        </p:nvSpPr>
+        <p:spPr>
+          <a:xfrm>
+            <a:off x="954087" y="1392199"/>
+            <a:ext cx="7235825" cy="5132425"/>
+          </a:xfrm>
+          <a:prstGeom prst="rect">
+            <a:avLst/>
+          </a:prstGeom>
+          <a:noFill/>
+          <a:ln w="38100">
+            <a:solidFill>
+              <a:schemeClr val="tx1"/>
+            </a:solidFill>
+            <a:prstDash val="lgDash"/>
+          </a:ln>
+        </p:spPr>
+        <p:style>
+          <a:lnRef idx="2">
+            <a:schemeClr val="accent1"/>
+          </a:lnRef>
+          <a:fillRef idx="1">
+            <a:schemeClr val="lt1"/>
+          </a:fillRef>
+          <a:effectRef idx="0">
+            <a:schemeClr val="accent1"/>
+          </a:effectRef>
+          <a:fontRef idx="minor">
+            <a:schemeClr val="dk1"/>
+          </a:fontRef>
+        </p:style>
+        <p:txBody>
+          <a:bodyPr rtlCol="0" anchor="t"/>
+          <a:lstStyle/>
+          <a:p>
+            <a:r>
+              <a:rPr lang="en-US" sz="2400" dirty="0" smtClean="0">
+                <a:solidFill>
+                  <a:schemeClr val="tx1"/>
+                </a:solidFill>
+              </a:rPr>
+              <a:t>Provider</a:t>
+            </a:r>
+            <a:endParaRPr lang="ru-RU" sz="2400" dirty="0">
+              <a:solidFill>
+                <a:schemeClr val="tx1"/>
+              </a:solidFill>
+            </a:endParaRPr>
+          </a:p>
+        </p:txBody>
+      </p:sp>
+      <p:sp>
+        <p:nvSpPr>
+          <p:cNvPr id="2" name="Прямоугольник 1"/>
+          <p:cNvSpPr/>
+          <p:nvPr/>
+        </p:nvSpPr>
+        <p:spPr>
+          <a:xfrm>
+            <a:off x="2843808" y="3428999"/>
+            <a:ext cx="4968552" cy="2879725"/>
+          </a:xfrm>
+          <a:prstGeom prst="rect">
+            <a:avLst/>
+          </a:prstGeom>
+          <a:noFill/>
+          <a:ln w="38100">
+            <a:solidFill>
+              <a:schemeClr val="tx1"/>
+            </a:solidFill>
+            <a:prstDash val="lgDash"/>
+          </a:ln>
+        </p:spPr>
+        <p:style>
+          <a:lnRef idx="2">
+            <a:schemeClr val="accent1"/>
+          </a:lnRef>
+          <a:fillRef idx="1">
+            <a:schemeClr val="lt1"/>
+          </a:fillRef>
+          <a:effectRef idx="0">
+            <a:schemeClr val="accent1"/>
+          </a:effectRef>
+          <a:fontRef idx="minor">
+            <a:schemeClr val="dk1"/>
+          </a:fontRef>
+        </p:style>
+        <p:txBody>
+          <a:bodyPr rtlCol="0" anchor="t"/>
+          <a:lstStyle/>
+          <a:p>
+            <a:r>
+              <a:rPr lang="en-US" sz="2400" dirty="0" smtClean="0">
+                <a:solidFill>
+                  <a:schemeClr val="tx1"/>
+                </a:solidFill>
+              </a:rPr>
+              <a:t>Container</a:t>
+            </a:r>
+            <a:endParaRPr lang="ru-RU" sz="2400" dirty="0">
+              <a:solidFill>
+                <a:schemeClr val="tx1"/>
+              </a:solidFill>
+            </a:endParaRPr>
+          </a:p>
+        </p:txBody>
+      </p:sp>
+      <p:sp>
+        <p:nvSpPr>
+          <p:cNvPr id="6" name="Скругленный прямоугольник 5"/>
+          <p:cNvSpPr/>
+          <p:nvPr/>
+        </p:nvSpPr>
+        <p:spPr>
+          <a:xfrm>
+            <a:off x="3492000" y="333375"/>
+            <a:ext cx="2160000" cy="720000"/>
+          </a:xfrm>
+          <a:prstGeom prst="roundRect">
+            <a:avLst/>
+          </a:prstGeom>
+          <a:solidFill>
+            <a:schemeClr val="bg1"/>
+          </a:solidFill>
+          <a:ln w="38100">
+            <a:solidFill>
+              <a:schemeClr val="tx1"/>
+            </a:solidFill>
+          </a:ln>
+        </p:spPr>
+        <p:style>
+          <a:lnRef idx="2">
+            <a:schemeClr val="accent1"/>
+          </a:lnRef>
+          <a:fillRef idx="1">
+            <a:schemeClr val="lt1"/>
+          </a:fillRef>
+          <a:effectRef idx="0">
+            <a:schemeClr val="accent1"/>
+          </a:effectRef>
+          <a:fontRef idx="minor">
+            <a:schemeClr val="dk1"/>
+          </a:fontRef>
+        </p:style>
+        <p:txBody>
+          <a:bodyPr rtlCol="0" anchor="ctr"/>
+          <a:lstStyle/>
+          <a:p>
+            <a:pPr algn="ctr"/>
+            <a:r>
+              <a:rPr lang="en-US" sz="2400" dirty="0" smtClean="0">
+                <a:solidFill>
+                  <a:schemeClr val="tx1"/>
+                </a:solidFill>
+              </a:rPr>
+              <a:t>Store</a:t>
+            </a:r>
+            <a:endParaRPr lang="ru-RU" sz="2400" dirty="0">
+              <a:solidFill>
+                <a:schemeClr val="tx1"/>
+              </a:solidFill>
+            </a:endParaRPr>
+          </a:p>
+        </p:txBody>
+      </p:sp>
+      <p:sp>
+        <p:nvSpPr>
+          <p:cNvPr id="8" name="Прямоугольник 7"/>
+          <p:cNvSpPr/>
+          <p:nvPr/>
+        </p:nvSpPr>
+        <p:spPr>
+          <a:xfrm>
+            <a:off x="5436096" y="4770653"/>
+            <a:ext cx="1862592" cy="458207"/>
+          </a:xfrm>
+          <a:prstGeom prst="rect">
+            <a:avLst/>
+          </a:prstGeom>
+          <a:noFill/>
+          <a:ln w="38100">
+            <a:solidFill>
+              <a:schemeClr val="tx1"/>
+            </a:solidFill>
+            <a:prstDash val="lgDash"/>
+          </a:ln>
+        </p:spPr>
+        <p:style>
+          <a:lnRef idx="2">
+            <a:schemeClr val="accent1"/>
+          </a:lnRef>
+          <a:fillRef idx="1">
+            <a:schemeClr val="lt1"/>
+          </a:fillRef>
+          <a:effectRef idx="0">
+            <a:schemeClr val="accent1"/>
+          </a:effectRef>
+          <a:fontRef idx="minor">
+            <a:schemeClr val="dk1"/>
+          </a:fontRef>
+        </p:style>
+        <p:txBody>
+          <a:bodyPr rtlCol="0" anchor="t"/>
+          <a:lstStyle/>
+          <a:p>
+            <a:pPr algn="ctr"/>
+            <a:r>
+              <a:rPr lang="en-US" sz="2400" dirty="0" smtClean="0">
+                <a:solidFill>
+                  <a:schemeClr val="tx1"/>
+                </a:solidFill>
+              </a:rPr>
+              <a:t>Component</a:t>
+            </a:r>
+            <a:endParaRPr lang="ru-RU" sz="2400" dirty="0">
+              <a:solidFill>
+                <a:schemeClr val="tx1"/>
+              </a:solidFill>
+            </a:endParaRPr>
+          </a:p>
+        </p:txBody>
+      </p:sp>
+    </p:spTree>
+    <p:extLst>
+      <p:ext uri="{BB962C8B-B14F-4D97-AF65-F5344CB8AC3E}">
+        <p14:creationId xmlns:p14="http://schemas.microsoft.com/office/powerpoint/2010/main" val="1705917900"/>
+      </p:ext>
+    </p:extLst>
+  </p:cSld>
+  <p:clrMapOvr>
+    <a:masterClrMapping/>
+  </p:clrMapOvr>
+</p:sld>
+</file>
+
+<file path=ppt/slides/slide15.xml><?xml version="1.0" encoding="utf-8"?>
+<p:sld xmlns:a="http://schemas.openxmlformats.org/drawingml/2006/main" xmlns:r="http://schemas.openxmlformats.org/officeDocument/2006/relationships" xmlns:p="http://schemas.openxmlformats.org/presentationml/2006/main">
+  <p:cSld>
+    <p:spTree>
+      <p:nvGrpSpPr>
+        <p:cNvPr id="1" name=""/>
+        <p:cNvGrpSpPr/>
+        <p:nvPr/>
+      </p:nvGrpSpPr>
+      <p:grpSpPr>
+        <a:xfrm>
+          <a:off x="0" y="0"/>
+          <a:ext cx="0" cy="0"/>
+          <a:chOff x="0" y="0"/>
+          <a:chExt cx="0" cy="0"/>
+        </a:xfrm>
+      </p:grpSpPr>
+      <p:sp>
+        <p:nvSpPr>
+          <p:cNvPr id="3" name="Прямоугольник 2"/>
+          <p:cNvSpPr/>
+          <p:nvPr/>
+        </p:nvSpPr>
+        <p:spPr>
+          <a:xfrm>
+            <a:off x="954087" y="1392199"/>
+            <a:ext cx="7235825" cy="5132425"/>
+          </a:xfrm>
+          <a:prstGeom prst="rect">
+            <a:avLst/>
+          </a:prstGeom>
+          <a:noFill/>
+          <a:ln w="38100">
+            <a:solidFill>
+              <a:schemeClr val="tx1"/>
+            </a:solidFill>
+            <a:prstDash val="lgDash"/>
+          </a:ln>
+        </p:spPr>
+        <p:style>
+          <a:lnRef idx="2">
+            <a:schemeClr val="accent1"/>
+          </a:lnRef>
+          <a:fillRef idx="1">
+            <a:schemeClr val="lt1"/>
+          </a:fillRef>
+          <a:effectRef idx="0">
+            <a:schemeClr val="accent1"/>
+          </a:effectRef>
+          <a:fontRef idx="minor">
+            <a:schemeClr val="dk1"/>
+          </a:fontRef>
+        </p:style>
+        <p:txBody>
+          <a:bodyPr rtlCol="0" anchor="t"/>
+          <a:lstStyle/>
+          <a:p>
+            <a:r>
+              <a:rPr lang="en-US" sz="2400" dirty="0" smtClean="0">
+                <a:solidFill>
+                  <a:schemeClr val="tx1"/>
+                </a:solidFill>
+              </a:rPr>
+              <a:t>Provider</a:t>
+            </a:r>
+            <a:endParaRPr lang="ru-RU" sz="2400" dirty="0">
+              <a:solidFill>
+                <a:schemeClr val="tx1"/>
+              </a:solidFill>
+            </a:endParaRPr>
+          </a:p>
+        </p:txBody>
+      </p:sp>
+      <p:sp>
+        <p:nvSpPr>
+          <p:cNvPr id="2" name="Прямоугольник 1"/>
+          <p:cNvSpPr/>
+          <p:nvPr/>
+        </p:nvSpPr>
+        <p:spPr>
+          <a:xfrm>
+            <a:off x="2843808" y="3428999"/>
+            <a:ext cx="4968552" cy="2879725"/>
+          </a:xfrm>
+          <a:prstGeom prst="rect">
+            <a:avLst/>
+          </a:prstGeom>
+          <a:noFill/>
+          <a:ln w="38100">
+            <a:solidFill>
+              <a:schemeClr val="tx1"/>
+            </a:solidFill>
+            <a:prstDash val="lgDash"/>
+          </a:ln>
+        </p:spPr>
+        <p:style>
+          <a:lnRef idx="2">
+            <a:schemeClr val="accent1"/>
+          </a:lnRef>
+          <a:fillRef idx="1">
+            <a:schemeClr val="lt1"/>
+          </a:fillRef>
+          <a:effectRef idx="0">
+            <a:schemeClr val="accent1"/>
+          </a:effectRef>
+          <a:fontRef idx="minor">
+            <a:schemeClr val="dk1"/>
+          </a:fontRef>
+        </p:style>
+        <p:txBody>
+          <a:bodyPr rtlCol="0" anchor="t"/>
+          <a:lstStyle/>
+          <a:p>
+            <a:r>
+              <a:rPr lang="en-US" sz="2400" dirty="0" smtClean="0">
+                <a:solidFill>
+                  <a:schemeClr val="tx1"/>
+                </a:solidFill>
+              </a:rPr>
+              <a:t>Container</a:t>
+            </a:r>
+            <a:endParaRPr lang="ru-RU" sz="2400" dirty="0">
+              <a:solidFill>
+                <a:schemeClr val="tx1"/>
+              </a:solidFill>
+            </a:endParaRPr>
+          </a:p>
+        </p:txBody>
+      </p:sp>
+      <p:sp>
+        <p:nvSpPr>
+          <p:cNvPr id="6" name="Скругленный прямоугольник 5"/>
+          <p:cNvSpPr/>
+          <p:nvPr/>
+        </p:nvSpPr>
+        <p:spPr>
+          <a:xfrm>
+            <a:off x="3492000" y="333375"/>
+            <a:ext cx="2160000" cy="720000"/>
+          </a:xfrm>
+          <a:prstGeom prst="roundRect">
+            <a:avLst/>
+          </a:prstGeom>
+          <a:solidFill>
+            <a:schemeClr val="bg1"/>
+          </a:solidFill>
+          <a:ln w="38100">
+            <a:solidFill>
+              <a:schemeClr val="tx1"/>
+            </a:solidFill>
+          </a:ln>
+        </p:spPr>
+        <p:style>
+          <a:lnRef idx="2">
+            <a:schemeClr val="accent1"/>
+          </a:lnRef>
+          <a:fillRef idx="1">
+            <a:schemeClr val="lt1"/>
+          </a:fillRef>
+          <a:effectRef idx="0">
+            <a:schemeClr val="accent1"/>
+          </a:effectRef>
+          <a:fontRef idx="minor">
+            <a:schemeClr val="dk1"/>
+          </a:fontRef>
+        </p:style>
+        <p:txBody>
+          <a:bodyPr rtlCol="0" anchor="ctr"/>
+          <a:lstStyle/>
+          <a:p>
+            <a:pPr algn="ctr"/>
+            <a:r>
+              <a:rPr lang="en-US" sz="2400" dirty="0" smtClean="0">
+                <a:solidFill>
+                  <a:schemeClr val="tx1"/>
+                </a:solidFill>
+              </a:rPr>
+              <a:t>Store</a:t>
+            </a:r>
+            <a:endParaRPr lang="ru-RU" sz="2400" dirty="0">
+              <a:solidFill>
+                <a:schemeClr val="tx1"/>
+              </a:solidFill>
+            </a:endParaRPr>
+          </a:p>
+        </p:txBody>
+      </p:sp>
+      <p:sp>
+        <p:nvSpPr>
+          <p:cNvPr id="7" name="Прямоугольник 6"/>
+          <p:cNvSpPr/>
+          <p:nvPr/>
+        </p:nvSpPr>
+        <p:spPr>
+          <a:xfrm>
+            <a:off x="1205116" y="2420887"/>
+            <a:ext cx="1440160" cy="461665"/>
+          </a:xfrm>
+          <a:prstGeom prst="rect">
+            <a:avLst/>
+          </a:prstGeom>
+          <a:noFill/>
+          <a:ln>
+            <a:noFill/>
+          </a:ln>
+        </p:spPr>
+        <p:style>
+          <a:lnRef idx="0">
+            <a:scrgbClr r="0" g="0" b="0"/>
+          </a:lnRef>
+          <a:fillRef idx="0">
+            <a:scrgbClr r="0" g="0" b="0"/>
+          </a:fillRef>
+          <a:effectRef idx="0">
+            <a:scrgbClr r="0" g="0" b="0"/>
+          </a:effectRef>
+          <a:fontRef idx="minor">
+            <a:schemeClr val="accent1"/>
+          </a:fontRef>
+        </p:style>
+        <p:txBody>
+          <a:bodyPr wrap="square" rtlCol="0" anchor="ctr">
+            <a:spAutoFit/>
+          </a:bodyPr>
+          <a:lstStyle/>
+          <a:p>
+            <a:pPr algn="ctr"/>
+            <a:r>
+              <a:rPr lang="en-US" sz="2400" i="1" dirty="0" err="1" smtClean="0"/>
+              <a:t>setState</a:t>
+            </a:r>
+            <a:endParaRPr lang="ru-RU" sz="2400" i="1" dirty="0"/>
+          </a:p>
+        </p:txBody>
+      </p:sp>
+      <p:sp>
+        <p:nvSpPr>
+          <p:cNvPr id="8" name="Прямоугольник 7"/>
+          <p:cNvSpPr/>
+          <p:nvPr/>
+        </p:nvSpPr>
+        <p:spPr>
+          <a:xfrm>
+            <a:off x="5436096" y="4770653"/>
+            <a:ext cx="1862592" cy="458207"/>
+          </a:xfrm>
+          <a:prstGeom prst="rect">
+            <a:avLst/>
+          </a:prstGeom>
+          <a:noFill/>
+          <a:ln w="38100">
+            <a:solidFill>
+              <a:schemeClr val="tx1"/>
+            </a:solidFill>
+            <a:prstDash val="lgDash"/>
+          </a:ln>
+        </p:spPr>
+        <p:style>
+          <a:lnRef idx="2">
+            <a:schemeClr val="accent1"/>
+          </a:lnRef>
+          <a:fillRef idx="1">
+            <a:schemeClr val="lt1"/>
+          </a:fillRef>
+          <a:effectRef idx="0">
+            <a:schemeClr val="accent1"/>
+          </a:effectRef>
+          <a:fontRef idx="minor">
+            <a:schemeClr val="dk1"/>
+          </a:fontRef>
+        </p:style>
+        <p:txBody>
+          <a:bodyPr rtlCol="0" anchor="t"/>
+          <a:lstStyle/>
+          <a:p>
+            <a:pPr algn="ctr"/>
+            <a:r>
+              <a:rPr lang="en-US" sz="2400" dirty="0" smtClean="0">
+                <a:solidFill>
+                  <a:schemeClr val="tx1"/>
+                </a:solidFill>
+              </a:rPr>
+              <a:t>Component</a:t>
+            </a:r>
+            <a:endParaRPr lang="ru-RU" sz="2400" dirty="0">
+              <a:solidFill>
+                <a:schemeClr val="tx1"/>
+              </a:solidFill>
+            </a:endParaRPr>
+          </a:p>
+        </p:txBody>
+      </p:sp>
+    </p:spTree>
+    <p:extLst>
+      <p:ext uri="{BB962C8B-B14F-4D97-AF65-F5344CB8AC3E}">
+        <p14:creationId xmlns:p14="http://schemas.microsoft.com/office/powerpoint/2010/main" val="1305143636"/>
+      </p:ext>
+    </p:extLst>
+  </p:cSld>
+  <p:clrMapOvr>
+    <a:masterClrMapping/>
+  </p:clrMapOvr>
+</p:sld>
+</file>
+
+<file path=ppt/slides/slide16.xml><?xml version="1.0" encoding="utf-8"?>
+<p:sld xmlns:a="http://schemas.openxmlformats.org/drawingml/2006/main" xmlns:r="http://schemas.openxmlformats.org/officeDocument/2006/relationships" xmlns:p="http://schemas.openxmlformats.org/presentationml/2006/main">
+  <p:cSld>
+    <p:spTree>
+      <p:nvGrpSpPr>
+        <p:cNvPr id="1" name=""/>
+        <p:cNvGrpSpPr/>
+        <p:nvPr/>
+      </p:nvGrpSpPr>
+      <p:grpSpPr>
+        <a:xfrm>
+          <a:off x="0" y="0"/>
+          <a:ext cx="0" cy="0"/>
+          <a:chOff x="0" y="0"/>
+          <a:chExt cx="0" cy="0"/>
+        </a:xfrm>
+      </p:grpSpPr>
+      <p:sp>
+        <p:nvSpPr>
+          <p:cNvPr id="3" name="Прямоугольник 2"/>
+          <p:cNvSpPr/>
+          <p:nvPr/>
+        </p:nvSpPr>
+        <p:spPr>
+          <a:xfrm>
+            <a:off x="954087" y="1392199"/>
+            <a:ext cx="7235825" cy="5132425"/>
+          </a:xfrm>
+          <a:prstGeom prst="rect">
+            <a:avLst/>
+          </a:prstGeom>
+          <a:pattFill prst="zigZag">
+            <a:fgClr>
+              <a:schemeClr val="accent1"/>
+            </a:fgClr>
+            <a:bgClr>
+              <a:schemeClr val="bg1"/>
+            </a:bgClr>
+          </a:pattFill>
+          <a:ln w="38100">
+            <a:solidFill>
+              <a:schemeClr val="tx1"/>
+            </a:solidFill>
+            <a:prstDash val="lgDash"/>
+          </a:ln>
+        </p:spPr>
+        <p:style>
+          <a:lnRef idx="2">
+            <a:schemeClr val="accent1"/>
+          </a:lnRef>
+          <a:fillRef idx="1">
+            <a:schemeClr val="lt1"/>
+          </a:fillRef>
+          <a:effectRef idx="0">
+            <a:schemeClr val="accent1"/>
+          </a:effectRef>
+          <a:fontRef idx="minor">
+            <a:schemeClr val="dk1"/>
+          </a:fontRef>
+        </p:style>
+        <p:txBody>
+          <a:bodyPr rtlCol="0" anchor="t"/>
+          <a:lstStyle/>
+          <a:p>
+            <a:r>
+              <a:rPr lang="en-US" sz="2400" dirty="0" smtClean="0">
+                <a:solidFill>
+                  <a:schemeClr val="tx1"/>
+                </a:solidFill>
+              </a:rPr>
+              <a:t>Provider</a:t>
+            </a:r>
+            <a:endParaRPr lang="ru-RU" sz="2400" dirty="0">
+              <a:solidFill>
+                <a:schemeClr val="tx1"/>
+              </a:solidFill>
+            </a:endParaRPr>
+          </a:p>
+        </p:txBody>
+      </p:sp>
+      <p:sp>
+        <p:nvSpPr>
+          <p:cNvPr id="2" name="Прямоугольник 1"/>
+          <p:cNvSpPr/>
+          <p:nvPr/>
+        </p:nvSpPr>
+        <p:spPr>
+          <a:xfrm>
+            <a:off x="2843808" y="3428999"/>
+            <a:ext cx="4968552" cy="2879725"/>
+          </a:xfrm>
+          <a:prstGeom prst="rect">
+            <a:avLst/>
+          </a:prstGeom>
+          <a:noFill/>
+          <a:ln w="38100">
+            <a:solidFill>
+              <a:schemeClr val="tx1"/>
+            </a:solidFill>
+            <a:prstDash val="lgDash"/>
+          </a:ln>
+        </p:spPr>
+        <p:style>
+          <a:lnRef idx="2">
+            <a:schemeClr val="accent1"/>
+          </a:lnRef>
+          <a:fillRef idx="1">
+            <a:schemeClr val="lt1"/>
+          </a:fillRef>
+          <a:effectRef idx="0">
+            <a:schemeClr val="accent1"/>
+          </a:effectRef>
+          <a:fontRef idx="minor">
+            <a:schemeClr val="dk1"/>
+          </a:fontRef>
+        </p:style>
+        <p:txBody>
+          <a:bodyPr rtlCol="0" anchor="t"/>
+          <a:lstStyle/>
+          <a:p>
+            <a:r>
+              <a:rPr lang="en-US" sz="2400" dirty="0" smtClean="0">
+                <a:solidFill>
+                  <a:schemeClr val="tx1"/>
+                </a:solidFill>
+              </a:rPr>
+              <a:t>Container</a:t>
+            </a:r>
+            <a:endParaRPr lang="ru-RU" sz="2400" dirty="0">
+              <a:solidFill>
+                <a:schemeClr val="tx1"/>
+              </a:solidFill>
+            </a:endParaRPr>
+          </a:p>
+        </p:txBody>
+      </p:sp>
+      <p:sp>
+        <p:nvSpPr>
+          <p:cNvPr id="5" name="Прямоугольник 4"/>
+          <p:cNvSpPr/>
+          <p:nvPr/>
+        </p:nvSpPr>
+        <p:spPr>
+          <a:xfrm>
+            <a:off x="1205116" y="2420887"/>
+            <a:ext cx="1440160" cy="461665"/>
+          </a:xfrm>
+          <a:prstGeom prst="rect">
+            <a:avLst/>
+          </a:prstGeom>
+          <a:noFill/>
+          <a:ln>
+            <a:noFill/>
+          </a:ln>
+        </p:spPr>
+        <p:style>
+          <a:lnRef idx="0">
+            <a:scrgbClr r="0" g="0" b="0"/>
+          </a:lnRef>
+          <a:fillRef idx="0">
+            <a:scrgbClr r="0" g="0" b="0"/>
+          </a:fillRef>
+          <a:effectRef idx="0">
+            <a:scrgbClr r="0" g="0" b="0"/>
+          </a:effectRef>
+          <a:fontRef idx="minor">
+            <a:schemeClr val="accent1"/>
+          </a:fontRef>
+        </p:style>
+        <p:txBody>
+          <a:bodyPr wrap="square" rtlCol="0" anchor="ctr">
+            <a:spAutoFit/>
+          </a:bodyPr>
+          <a:lstStyle/>
+          <a:p>
+            <a:pPr algn="ctr"/>
+            <a:r>
+              <a:rPr lang="en-US" sz="2400" i="1" dirty="0" err="1" smtClean="0"/>
+              <a:t>setState</a:t>
+            </a:r>
+            <a:endParaRPr lang="ru-RU" sz="2400" i="1" dirty="0"/>
+          </a:p>
+        </p:txBody>
+      </p:sp>
+      <p:sp>
+        <p:nvSpPr>
+          <p:cNvPr id="6" name="Скругленный прямоугольник 5"/>
+          <p:cNvSpPr/>
+          <p:nvPr/>
+        </p:nvSpPr>
+        <p:spPr>
+          <a:xfrm>
+            <a:off x="3492000" y="333375"/>
+            <a:ext cx="2160000" cy="720000"/>
+          </a:xfrm>
+          <a:prstGeom prst="roundRect">
+            <a:avLst/>
+          </a:prstGeom>
+          <a:solidFill>
+            <a:schemeClr val="bg1"/>
+          </a:solidFill>
+          <a:ln w="38100">
+            <a:solidFill>
+              <a:schemeClr val="tx1"/>
+            </a:solidFill>
+          </a:ln>
+        </p:spPr>
+        <p:style>
+          <a:lnRef idx="2">
+            <a:schemeClr val="accent1"/>
+          </a:lnRef>
+          <a:fillRef idx="1">
+            <a:schemeClr val="lt1"/>
+          </a:fillRef>
+          <a:effectRef idx="0">
+            <a:schemeClr val="accent1"/>
+          </a:effectRef>
+          <a:fontRef idx="minor">
+            <a:schemeClr val="dk1"/>
+          </a:fontRef>
+        </p:style>
+        <p:txBody>
+          <a:bodyPr rtlCol="0" anchor="ctr"/>
+          <a:lstStyle/>
+          <a:p>
+            <a:pPr algn="ctr"/>
+            <a:r>
+              <a:rPr lang="en-US" sz="2400" dirty="0" smtClean="0">
+                <a:solidFill>
+                  <a:schemeClr val="tx1"/>
+                </a:solidFill>
+              </a:rPr>
+              <a:t>Store</a:t>
+            </a:r>
+            <a:endParaRPr lang="ru-RU" sz="2400" dirty="0">
+              <a:solidFill>
+                <a:schemeClr val="tx1"/>
+              </a:solidFill>
+            </a:endParaRPr>
+          </a:p>
+        </p:txBody>
+      </p:sp>
+      <p:sp>
+        <p:nvSpPr>
+          <p:cNvPr id="34" name="Прямоугольник 33"/>
+          <p:cNvSpPr/>
+          <p:nvPr/>
+        </p:nvSpPr>
+        <p:spPr>
+          <a:xfrm>
+            <a:off x="5436096" y="4770653"/>
+            <a:ext cx="1862592" cy="458207"/>
+          </a:xfrm>
+          <a:prstGeom prst="rect">
+            <a:avLst/>
+          </a:prstGeom>
+          <a:noFill/>
+          <a:ln w="38100">
+            <a:solidFill>
+              <a:schemeClr val="tx1"/>
+            </a:solidFill>
+            <a:prstDash val="lgDash"/>
+          </a:ln>
+        </p:spPr>
+        <p:style>
+          <a:lnRef idx="2">
+            <a:schemeClr val="accent1"/>
+          </a:lnRef>
+          <a:fillRef idx="1">
+            <a:schemeClr val="lt1"/>
+          </a:fillRef>
+          <a:effectRef idx="0">
+            <a:schemeClr val="accent1"/>
+          </a:effectRef>
+          <a:fontRef idx="minor">
+            <a:schemeClr val="dk1"/>
+          </a:fontRef>
+        </p:style>
+        <p:txBody>
+          <a:bodyPr rtlCol="0" anchor="t"/>
+          <a:lstStyle/>
+          <a:p>
+            <a:pPr algn="ctr"/>
+            <a:r>
+              <a:rPr lang="en-US" sz="2400" dirty="0" smtClean="0">
+                <a:solidFill>
+                  <a:schemeClr val="tx1"/>
+                </a:solidFill>
+              </a:rPr>
+              <a:t>Component</a:t>
+            </a:r>
+            <a:endParaRPr lang="ru-RU" sz="2400" dirty="0">
+              <a:solidFill>
+                <a:schemeClr val="tx1"/>
+              </a:solidFill>
+            </a:endParaRPr>
+          </a:p>
+        </p:txBody>
+      </p:sp>
+    </p:spTree>
+    <p:extLst>
+      <p:ext uri="{BB962C8B-B14F-4D97-AF65-F5344CB8AC3E}">
+        <p14:creationId xmlns:p14="http://schemas.microsoft.com/office/powerpoint/2010/main" val="3940681333"/>
+      </p:ext>
+    </p:extLst>
+  </p:cSld>
+  <p:clrMapOvr>
+    <a:masterClrMapping/>
+  </p:clrMapOvr>
+</p:sld>
+</file>
+
+<file path=ppt/slides/slide17.xml><?xml version="1.0" encoding="utf-8"?>
+<p:sld xmlns:a="http://schemas.openxmlformats.org/drawingml/2006/main" xmlns:r="http://schemas.openxmlformats.org/officeDocument/2006/relationships" xmlns:p="http://schemas.openxmlformats.org/presentationml/2006/main">
+  <p:cSld>
+    <p:spTree>
+      <p:nvGrpSpPr>
+        <p:cNvPr id="1" name=""/>
+        <p:cNvGrpSpPr/>
+        <p:nvPr/>
+      </p:nvGrpSpPr>
+      <p:grpSpPr>
+        <a:xfrm>
+          <a:off x="0" y="0"/>
+          <a:ext cx="0" cy="0"/>
+          <a:chOff x="0" y="0"/>
+          <a:chExt cx="0" cy="0"/>
+        </a:xfrm>
+      </p:grpSpPr>
+      <p:sp>
+        <p:nvSpPr>
+          <p:cNvPr id="3" name="Прямоугольник 2"/>
+          <p:cNvSpPr/>
+          <p:nvPr/>
+        </p:nvSpPr>
+        <p:spPr>
+          <a:xfrm>
+            <a:off x="954087" y="1392199"/>
+            <a:ext cx="7235825" cy="5132425"/>
+          </a:xfrm>
+          <a:prstGeom prst="rect">
+            <a:avLst/>
+          </a:prstGeom>
+          <a:pattFill prst="zigZag">
+            <a:fgClr>
+              <a:schemeClr val="accent1"/>
+            </a:fgClr>
+            <a:bgClr>
+              <a:schemeClr val="bg1"/>
+            </a:bgClr>
+          </a:pattFill>
+          <a:ln w="38100">
+            <a:solidFill>
+              <a:schemeClr val="tx1"/>
+            </a:solidFill>
+            <a:prstDash val="lgDash"/>
+          </a:ln>
+        </p:spPr>
+        <p:style>
+          <a:lnRef idx="2">
+            <a:schemeClr val="accent1"/>
+          </a:lnRef>
+          <a:fillRef idx="1">
+            <a:schemeClr val="lt1"/>
+          </a:fillRef>
+          <a:effectRef idx="0">
+            <a:schemeClr val="accent1"/>
+          </a:effectRef>
+          <a:fontRef idx="minor">
+            <a:schemeClr val="dk1"/>
+          </a:fontRef>
+        </p:style>
+        <p:txBody>
+          <a:bodyPr rtlCol="0" anchor="t"/>
+          <a:lstStyle/>
+          <a:p>
+            <a:r>
+              <a:rPr lang="en-US" sz="2400" dirty="0" smtClean="0">
+                <a:solidFill>
+                  <a:schemeClr val="tx1"/>
+                </a:solidFill>
+              </a:rPr>
+              <a:t>Provider</a:t>
+            </a:r>
+            <a:endParaRPr lang="ru-RU" sz="2400" dirty="0">
+              <a:solidFill>
+                <a:schemeClr val="tx1"/>
+              </a:solidFill>
+            </a:endParaRPr>
+          </a:p>
+        </p:txBody>
+      </p:sp>
+      <p:sp>
+        <p:nvSpPr>
+          <p:cNvPr id="2" name="Прямоугольник 1"/>
+          <p:cNvSpPr/>
+          <p:nvPr/>
+        </p:nvSpPr>
+        <p:spPr>
+          <a:xfrm>
+            <a:off x="2843808" y="3428999"/>
+            <a:ext cx="4968552" cy="2879725"/>
+          </a:xfrm>
+          <a:prstGeom prst="rect">
+            <a:avLst/>
+          </a:prstGeom>
+          <a:solidFill>
+            <a:schemeClr val="bg1"/>
+          </a:solidFill>
+          <a:ln w="38100">
+            <a:solidFill>
+              <a:schemeClr val="tx1"/>
+            </a:solidFill>
+            <a:prstDash val="solid"/>
+          </a:ln>
+        </p:spPr>
+        <p:style>
+          <a:lnRef idx="2">
+            <a:schemeClr val="accent1"/>
+          </a:lnRef>
+          <a:fillRef idx="1">
+            <a:schemeClr val="lt1"/>
+          </a:fillRef>
+          <a:effectRef idx="0">
+            <a:schemeClr val="accent1"/>
+          </a:effectRef>
+          <a:fontRef idx="minor">
+            <a:schemeClr val="dk1"/>
+          </a:fontRef>
+        </p:style>
+        <p:txBody>
+          <a:bodyPr rtlCol="0" anchor="t"/>
+          <a:lstStyle/>
+          <a:p>
+            <a:r>
+              <a:rPr lang="en-US" sz="2400" dirty="0" smtClean="0">
+                <a:solidFill>
+                  <a:schemeClr val="tx1"/>
+                </a:solidFill>
+              </a:rPr>
+              <a:t>Container</a:t>
+            </a:r>
+            <a:endParaRPr lang="ru-RU" sz="2400" dirty="0">
+              <a:solidFill>
+                <a:schemeClr val="tx1"/>
+              </a:solidFill>
+            </a:endParaRPr>
+          </a:p>
+        </p:txBody>
+      </p:sp>
+      <p:sp>
+        <p:nvSpPr>
+          <p:cNvPr id="5" name="Прямоугольник 4"/>
+          <p:cNvSpPr/>
+          <p:nvPr/>
+        </p:nvSpPr>
+        <p:spPr>
+          <a:xfrm>
+            <a:off x="1205116" y="2420887"/>
+            <a:ext cx="1440160" cy="461665"/>
+          </a:xfrm>
+          <a:prstGeom prst="rect">
+            <a:avLst/>
+          </a:prstGeom>
+          <a:noFill/>
+          <a:ln>
+            <a:noFill/>
+          </a:ln>
+        </p:spPr>
+        <p:style>
+          <a:lnRef idx="0">
+            <a:scrgbClr r="0" g="0" b="0"/>
+          </a:lnRef>
+          <a:fillRef idx="0">
+            <a:scrgbClr r="0" g="0" b="0"/>
+          </a:fillRef>
+          <a:effectRef idx="0">
+            <a:scrgbClr r="0" g="0" b="0"/>
+          </a:effectRef>
+          <a:fontRef idx="minor">
+            <a:schemeClr val="accent1"/>
+          </a:fontRef>
+        </p:style>
+        <p:txBody>
+          <a:bodyPr wrap="square" rtlCol="0" anchor="ctr">
+            <a:spAutoFit/>
+          </a:bodyPr>
+          <a:lstStyle/>
+          <a:p>
+            <a:pPr algn="ctr"/>
+            <a:r>
+              <a:rPr lang="en-US" sz="2400" i="1" dirty="0" err="1" smtClean="0"/>
+              <a:t>setState</a:t>
+            </a:r>
+            <a:endParaRPr lang="ru-RU" sz="2400" i="1" dirty="0"/>
+          </a:p>
+        </p:txBody>
+      </p:sp>
+      <p:sp>
+        <p:nvSpPr>
+          <p:cNvPr id="6" name="Скругленный прямоугольник 5"/>
+          <p:cNvSpPr/>
+          <p:nvPr/>
+        </p:nvSpPr>
+        <p:spPr>
+          <a:xfrm>
+            <a:off x="3492000" y="333375"/>
+            <a:ext cx="2160000" cy="720000"/>
+          </a:xfrm>
+          <a:prstGeom prst="roundRect">
+            <a:avLst/>
+          </a:prstGeom>
+          <a:ln w="38100">
+            <a:solidFill>
+              <a:schemeClr val="tx1"/>
+            </a:solidFill>
+          </a:ln>
+        </p:spPr>
+        <p:style>
+          <a:lnRef idx="2">
+            <a:schemeClr val="accent1"/>
+          </a:lnRef>
+          <a:fillRef idx="1">
+            <a:schemeClr val="lt1"/>
+          </a:fillRef>
+          <a:effectRef idx="0">
+            <a:schemeClr val="accent1"/>
+          </a:effectRef>
+          <a:fontRef idx="minor">
+            <a:schemeClr val="dk1"/>
+          </a:fontRef>
+        </p:style>
+        <p:txBody>
+          <a:bodyPr rtlCol="0" anchor="ctr"/>
+          <a:lstStyle/>
+          <a:p>
+            <a:pPr algn="ctr"/>
+            <a:r>
+              <a:rPr lang="en-US" sz="2400" dirty="0" smtClean="0">
+                <a:solidFill>
+                  <a:schemeClr val="tx1"/>
+                </a:solidFill>
+              </a:rPr>
+              <a:t>Store</a:t>
+            </a:r>
+            <a:endParaRPr lang="ru-RU" sz="2400" dirty="0">
+              <a:solidFill>
+                <a:schemeClr val="tx1"/>
+              </a:solidFill>
+            </a:endParaRPr>
+          </a:p>
+        </p:txBody>
+      </p:sp>
+      <p:sp>
+        <p:nvSpPr>
+          <p:cNvPr id="7" name="Прямоугольник 6"/>
+          <p:cNvSpPr/>
+          <p:nvPr/>
+        </p:nvSpPr>
+        <p:spPr>
+          <a:xfrm>
+            <a:off x="5436096" y="4770653"/>
+            <a:ext cx="1862592" cy="458207"/>
+          </a:xfrm>
+          <a:prstGeom prst="rect">
+            <a:avLst/>
+          </a:prstGeom>
+          <a:noFill/>
+          <a:ln w="38100">
+            <a:solidFill>
+              <a:schemeClr val="tx1"/>
+            </a:solidFill>
+            <a:prstDash val="lgDash"/>
+          </a:ln>
+        </p:spPr>
+        <p:style>
+          <a:lnRef idx="2">
+            <a:schemeClr val="accent1"/>
+          </a:lnRef>
+          <a:fillRef idx="1">
+            <a:schemeClr val="lt1"/>
+          </a:fillRef>
+          <a:effectRef idx="0">
+            <a:schemeClr val="accent1"/>
+          </a:effectRef>
+          <a:fontRef idx="minor">
+            <a:schemeClr val="dk1"/>
+          </a:fontRef>
+        </p:style>
+        <p:txBody>
+          <a:bodyPr rtlCol="0" anchor="t"/>
+          <a:lstStyle/>
+          <a:p>
+            <a:pPr algn="ctr"/>
+            <a:r>
+              <a:rPr lang="en-US" sz="2400" dirty="0" smtClean="0">
+                <a:solidFill>
+                  <a:schemeClr val="tx1"/>
+                </a:solidFill>
+              </a:rPr>
+              <a:t>Component</a:t>
+            </a:r>
+            <a:endParaRPr lang="ru-RU" sz="2400" dirty="0">
+              <a:solidFill>
+                <a:schemeClr val="tx1"/>
+              </a:solidFill>
+            </a:endParaRPr>
+          </a:p>
+        </p:txBody>
+      </p:sp>
+    </p:spTree>
+    <p:extLst>
+      <p:ext uri="{BB962C8B-B14F-4D97-AF65-F5344CB8AC3E}">
+        <p14:creationId xmlns:p14="http://schemas.microsoft.com/office/powerpoint/2010/main" val="1760092194"/>
+      </p:ext>
+    </p:extLst>
+  </p:cSld>
+  <p:clrMapOvr>
+    <a:masterClrMapping/>
+  </p:clrMapOvr>
+</p:sld>
+</file>
+
+<file path=ppt/slides/slide18.xml><?xml version="1.0" encoding="utf-8"?>
+<p:sld xmlns:a="http://schemas.openxmlformats.org/drawingml/2006/main" xmlns:r="http://schemas.openxmlformats.org/officeDocument/2006/relationships" xmlns:p="http://schemas.openxmlformats.org/presentationml/2006/main">
+  <p:cSld>
+    <p:spTree>
+      <p:nvGrpSpPr>
+        <p:cNvPr id="1" name=""/>
+        <p:cNvGrpSpPr/>
+        <p:nvPr/>
+      </p:nvGrpSpPr>
+      <p:grpSpPr>
+        <a:xfrm>
+          <a:off x="0" y="0"/>
+          <a:ext cx="0" cy="0"/>
+          <a:chOff x="0" y="0"/>
+          <a:chExt cx="0" cy="0"/>
+        </a:xfrm>
+      </p:grpSpPr>
+      <p:sp>
+        <p:nvSpPr>
+          <p:cNvPr id="3" name="Прямоугольник 2"/>
+          <p:cNvSpPr/>
+          <p:nvPr/>
+        </p:nvSpPr>
+        <p:spPr>
+          <a:xfrm>
+            <a:off x="954087" y="1392199"/>
+            <a:ext cx="7235825" cy="5132425"/>
+          </a:xfrm>
+          <a:prstGeom prst="rect">
+            <a:avLst/>
+          </a:prstGeom>
+          <a:noFill/>
+          <a:ln w="38100">
+            <a:solidFill>
+              <a:schemeClr val="tx1"/>
+            </a:solidFill>
+            <a:prstDash val="lgDash"/>
+          </a:ln>
+        </p:spPr>
+        <p:style>
+          <a:lnRef idx="2">
+            <a:schemeClr val="accent1"/>
+          </a:lnRef>
+          <a:fillRef idx="1">
+            <a:schemeClr val="lt1"/>
+          </a:fillRef>
+          <a:effectRef idx="0">
+            <a:schemeClr val="accent1"/>
+          </a:effectRef>
+          <a:fontRef idx="minor">
+            <a:schemeClr val="dk1"/>
+          </a:fontRef>
+        </p:style>
+        <p:txBody>
+          <a:bodyPr rtlCol="0" anchor="t"/>
+          <a:lstStyle/>
+          <a:p>
+            <a:r>
+              <a:rPr lang="en-US" sz="2400" dirty="0" smtClean="0">
+                <a:solidFill>
+                  <a:schemeClr val="tx1"/>
+                </a:solidFill>
+              </a:rPr>
+              <a:t>Provider</a:t>
+            </a:r>
+            <a:endParaRPr lang="ru-RU" sz="2400" dirty="0">
+              <a:solidFill>
+                <a:schemeClr val="tx1"/>
+              </a:solidFill>
+            </a:endParaRPr>
+          </a:p>
+        </p:txBody>
+      </p:sp>
+      <p:sp>
+        <p:nvSpPr>
+          <p:cNvPr id="2" name="Прямоугольник 1"/>
+          <p:cNvSpPr/>
+          <p:nvPr/>
+        </p:nvSpPr>
+        <p:spPr>
+          <a:xfrm>
+            <a:off x="2843808" y="3428999"/>
+            <a:ext cx="4968552" cy="2879725"/>
+          </a:xfrm>
+          <a:prstGeom prst="rect">
+            <a:avLst/>
+          </a:prstGeom>
+          <a:noFill/>
+          <a:ln w="38100">
+            <a:solidFill>
+              <a:schemeClr val="tx1"/>
+            </a:solidFill>
+            <a:prstDash val="lgDash"/>
+          </a:ln>
+        </p:spPr>
+        <p:style>
+          <a:lnRef idx="2">
+            <a:schemeClr val="accent1"/>
+          </a:lnRef>
+          <a:fillRef idx="1">
+            <a:schemeClr val="lt1"/>
+          </a:fillRef>
+          <a:effectRef idx="0">
+            <a:schemeClr val="accent1"/>
+          </a:effectRef>
+          <a:fontRef idx="minor">
+            <a:schemeClr val="dk1"/>
+          </a:fontRef>
+        </p:style>
+        <p:txBody>
+          <a:bodyPr rtlCol="0" anchor="t"/>
+          <a:lstStyle/>
+          <a:p>
+            <a:r>
+              <a:rPr lang="en-US" sz="2400" dirty="0" smtClean="0">
+                <a:solidFill>
+                  <a:schemeClr val="tx1"/>
+                </a:solidFill>
+              </a:rPr>
+              <a:t>Container</a:t>
+            </a:r>
+            <a:endParaRPr lang="ru-RU" sz="2400" dirty="0">
+              <a:solidFill>
+                <a:schemeClr val="tx1"/>
+              </a:solidFill>
+            </a:endParaRPr>
+          </a:p>
+        </p:txBody>
+      </p:sp>
+      <p:sp>
+        <p:nvSpPr>
+          <p:cNvPr id="6" name="Скругленный прямоугольник 5"/>
+          <p:cNvSpPr/>
+          <p:nvPr/>
+        </p:nvSpPr>
+        <p:spPr>
+          <a:xfrm>
+            <a:off x="3492000" y="333375"/>
+            <a:ext cx="2160000" cy="720000"/>
+          </a:xfrm>
+          <a:prstGeom prst="roundRect">
+            <a:avLst/>
+          </a:prstGeom>
+          <a:ln w="38100">
+            <a:solidFill>
+              <a:schemeClr val="tx1"/>
+            </a:solidFill>
+          </a:ln>
+        </p:spPr>
+        <p:style>
+          <a:lnRef idx="2">
+            <a:schemeClr val="accent1"/>
+          </a:lnRef>
+          <a:fillRef idx="1">
+            <a:schemeClr val="lt1"/>
+          </a:fillRef>
+          <a:effectRef idx="0">
+            <a:schemeClr val="accent1"/>
+          </a:effectRef>
+          <a:fontRef idx="minor">
+            <a:schemeClr val="dk1"/>
+          </a:fontRef>
+        </p:style>
+        <p:txBody>
+          <a:bodyPr rtlCol="0" anchor="ctr"/>
+          <a:lstStyle/>
+          <a:p>
+            <a:pPr algn="ctr"/>
+            <a:r>
+              <a:rPr lang="en-US" sz="2400" dirty="0" smtClean="0">
+                <a:solidFill>
+                  <a:schemeClr val="tx1"/>
+                </a:solidFill>
+              </a:rPr>
+              <a:t>Store</a:t>
+            </a:r>
+            <a:endParaRPr lang="ru-RU" sz="2400" dirty="0">
+              <a:solidFill>
+                <a:schemeClr val="tx1"/>
+              </a:solidFill>
+            </a:endParaRPr>
+          </a:p>
+        </p:txBody>
+      </p:sp>
+      <p:sp>
+        <p:nvSpPr>
+          <p:cNvPr id="8" name="Прямоугольник 7"/>
+          <p:cNvSpPr/>
+          <p:nvPr/>
+        </p:nvSpPr>
+        <p:spPr>
+          <a:xfrm>
+            <a:off x="6299133" y="869261"/>
+            <a:ext cx="1044117" cy="461665"/>
+          </a:xfrm>
+          <a:prstGeom prst="rect">
+            <a:avLst/>
+          </a:prstGeom>
+          <a:noFill/>
+          <a:ln>
+            <a:noFill/>
+          </a:ln>
+        </p:spPr>
+        <p:style>
+          <a:lnRef idx="0">
+            <a:scrgbClr r="0" g="0" b="0"/>
+          </a:lnRef>
+          <a:fillRef idx="0">
+            <a:scrgbClr r="0" g="0" b="0"/>
+          </a:fillRef>
+          <a:effectRef idx="0">
+            <a:scrgbClr r="0" g="0" b="0"/>
+          </a:effectRef>
+          <a:fontRef idx="minor">
+            <a:schemeClr val="accent1"/>
+          </a:fontRef>
+        </p:style>
+        <p:txBody>
+          <a:bodyPr rtlCol="0" anchor="ctr">
+            <a:spAutoFit/>
+          </a:bodyPr>
+          <a:lstStyle/>
+          <a:p>
+            <a:pPr algn="ctr"/>
+            <a:r>
+              <a:rPr lang="en-US" sz="2400" i="1" dirty="0" smtClean="0"/>
+              <a:t>action</a:t>
+            </a:r>
+            <a:endParaRPr lang="ru-RU" sz="2400" i="1" dirty="0"/>
+          </a:p>
+        </p:txBody>
+      </p:sp>
+      <p:sp>
+        <p:nvSpPr>
+          <p:cNvPr id="11" name="Выгнутая вниз стрелка 10"/>
+          <p:cNvSpPr/>
+          <p:nvPr/>
+        </p:nvSpPr>
+        <p:spPr>
+          <a:xfrm rot="13783328">
+            <a:off x="5351856" y="763136"/>
+            <a:ext cx="3893665" cy="1207129"/>
+          </a:xfrm>
+          <a:prstGeom prst="curvedUpArrow">
+            <a:avLst>
+              <a:gd name="adj1" fmla="val 12950"/>
+              <a:gd name="adj2" fmla="val 30280"/>
+              <a:gd name="adj3" fmla="val 16585"/>
+            </a:avLst>
+          </a:prstGeom>
+        </p:spPr>
+        <p:style>
+          <a:lnRef idx="2">
+            <a:schemeClr val="accent1">
+              <a:shade val="50000"/>
+            </a:schemeClr>
+          </a:lnRef>
+          <a:fillRef idx="1">
+            <a:schemeClr val="accent1"/>
+          </a:fillRef>
+          <a:effectRef idx="0">
+            <a:schemeClr val="accent1"/>
+          </a:effectRef>
+          <a:fontRef idx="minor">
+            <a:schemeClr val="lt1"/>
+          </a:fontRef>
+        </p:style>
+        <p:txBody>
+          <a:bodyPr rtlCol="0" anchor="ctr"/>
+          <a:lstStyle/>
+          <a:p>
+            <a:pPr algn="ctr"/>
+            <a:endParaRPr lang="ru-RU">
+              <a:solidFill>
+                <a:schemeClr val="tx1"/>
+              </a:solidFill>
+            </a:endParaRPr>
+          </a:p>
+        </p:txBody>
+      </p:sp>
+      <p:sp>
+        <p:nvSpPr>
+          <p:cNvPr id="12" name="Выгнутая вниз стрелка 11"/>
+          <p:cNvSpPr/>
+          <p:nvPr/>
+        </p:nvSpPr>
+        <p:spPr>
+          <a:xfrm rot="13783328">
+            <a:off x="5684554" y="649312"/>
+            <a:ext cx="2499566" cy="1179759"/>
+          </a:xfrm>
+          <a:prstGeom prst="curvedUpArrow">
+            <a:avLst>
+              <a:gd name="adj1" fmla="val 14740"/>
+              <a:gd name="adj2" fmla="val 37741"/>
+              <a:gd name="adj3" fmla="val 18130"/>
+            </a:avLst>
+          </a:prstGeom>
+        </p:spPr>
+        <p:style>
+          <a:lnRef idx="2">
+            <a:schemeClr val="accent1">
+              <a:shade val="50000"/>
+            </a:schemeClr>
+          </a:lnRef>
+          <a:fillRef idx="1">
+            <a:schemeClr val="accent1"/>
+          </a:fillRef>
+          <a:effectRef idx="0">
+            <a:schemeClr val="accent1"/>
+          </a:effectRef>
+          <a:fontRef idx="minor">
+            <a:schemeClr val="lt1"/>
+          </a:fontRef>
+        </p:style>
+        <p:txBody>
+          <a:bodyPr rtlCol="0" anchor="ctr"/>
+          <a:lstStyle/>
+          <a:p>
+            <a:pPr algn="ctr"/>
+            <a:endParaRPr lang="ru-RU">
+              <a:solidFill>
+                <a:schemeClr val="tx1"/>
+              </a:solidFill>
+            </a:endParaRPr>
+          </a:p>
+        </p:txBody>
+      </p:sp>
+      <p:sp>
+        <p:nvSpPr>
+          <p:cNvPr id="15" name="Прямоугольник 14"/>
+          <p:cNvSpPr/>
+          <p:nvPr/>
+        </p:nvSpPr>
+        <p:spPr>
+          <a:xfrm>
+            <a:off x="5553700" y="2510235"/>
+            <a:ext cx="1575792" cy="439836"/>
+          </a:xfrm>
+          <a:prstGeom prst="rect">
+            <a:avLst/>
+          </a:prstGeom>
+          <a:noFill/>
+          <a:ln w="38100">
+            <a:solidFill>
+              <a:schemeClr val="tx1"/>
+            </a:solidFill>
+            <a:prstDash val="lgDash"/>
+          </a:ln>
+        </p:spPr>
+        <p:style>
+          <a:lnRef idx="2">
+            <a:schemeClr val="accent1"/>
+          </a:lnRef>
+          <a:fillRef idx="1">
+            <a:schemeClr val="lt1"/>
+          </a:fillRef>
+          <a:effectRef idx="0">
+            <a:schemeClr val="accent1"/>
+          </a:effectRef>
+          <a:fontRef idx="minor">
+            <a:schemeClr val="dk1"/>
+          </a:fontRef>
+        </p:style>
+        <p:txBody>
+          <a:bodyPr rtlCol="0" anchor="t"/>
+          <a:lstStyle/>
+          <a:p>
+            <a:r>
+              <a:rPr lang="en-US" sz="2400" dirty="0" smtClean="0">
+                <a:solidFill>
+                  <a:schemeClr val="tx1"/>
+                </a:solidFill>
+              </a:rPr>
+              <a:t>Container</a:t>
+            </a:r>
+            <a:endParaRPr lang="ru-RU" sz="2400" dirty="0">
+              <a:solidFill>
+                <a:schemeClr val="tx1"/>
+              </a:solidFill>
+            </a:endParaRPr>
+          </a:p>
+        </p:txBody>
+      </p:sp>
+      <p:sp>
+        <p:nvSpPr>
+          <p:cNvPr id="13" name="Прямоугольник 12"/>
+          <p:cNvSpPr/>
+          <p:nvPr/>
+        </p:nvSpPr>
+        <p:spPr>
+          <a:xfrm>
+            <a:off x="5436096" y="4770653"/>
+            <a:ext cx="1862592" cy="458207"/>
+          </a:xfrm>
+          <a:prstGeom prst="rect">
+            <a:avLst/>
+          </a:prstGeom>
+          <a:noFill/>
+          <a:ln w="38100">
+            <a:solidFill>
+              <a:schemeClr val="tx1"/>
+            </a:solidFill>
+            <a:prstDash val="lgDash"/>
+          </a:ln>
+        </p:spPr>
+        <p:style>
+          <a:lnRef idx="2">
+            <a:schemeClr val="accent1"/>
+          </a:lnRef>
+          <a:fillRef idx="1">
+            <a:schemeClr val="lt1"/>
+          </a:fillRef>
+          <a:effectRef idx="0">
+            <a:schemeClr val="accent1"/>
+          </a:effectRef>
+          <a:fontRef idx="minor">
+            <a:schemeClr val="dk1"/>
+          </a:fontRef>
+        </p:style>
+        <p:txBody>
+          <a:bodyPr rtlCol="0" anchor="t"/>
+          <a:lstStyle/>
+          <a:p>
+            <a:pPr algn="ctr"/>
+            <a:r>
+              <a:rPr lang="en-US" sz="2400" dirty="0" smtClean="0">
+                <a:solidFill>
+                  <a:schemeClr val="tx1"/>
+                </a:solidFill>
+              </a:rPr>
+              <a:t>Component</a:t>
+            </a:r>
+            <a:endParaRPr lang="ru-RU" sz="2400" dirty="0">
+              <a:solidFill>
+                <a:schemeClr val="tx1"/>
+              </a:solidFill>
+            </a:endParaRPr>
+          </a:p>
+        </p:txBody>
+      </p:sp>
+    </p:spTree>
+    <p:extLst>
+      <p:ext uri="{BB962C8B-B14F-4D97-AF65-F5344CB8AC3E}">
+        <p14:creationId xmlns:p14="http://schemas.microsoft.com/office/powerpoint/2010/main" val="2226266066"/>
+      </p:ext>
+    </p:extLst>
+  </p:cSld>
+  <p:clrMapOvr>
+    <a:masterClrMapping/>
+  </p:clrMapOvr>
+</p:sld>
+</file>
+
+<file path=ppt/slides/slide19.xml><?xml version="1.0" encoding="utf-8"?>
+<p:sld xmlns:a="http://schemas.openxmlformats.org/drawingml/2006/main" xmlns:r="http://schemas.openxmlformats.org/officeDocument/2006/relationships" xmlns:p="http://schemas.openxmlformats.org/presentationml/2006/main">
+  <p:cSld>
+    <p:spTree>
+      <p:nvGrpSpPr>
+        <p:cNvPr id="1" name=""/>
+        <p:cNvGrpSpPr/>
+        <p:nvPr/>
+      </p:nvGrpSpPr>
+      <p:grpSpPr>
+        <a:xfrm>
+          <a:off x="0" y="0"/>
+          <a:ext cx="0" cy="0"/>
+          <a:chOff x="0" y="0"/>
+          <a:chExt cx="0" cy="0"/>
+        </a:xfrm>
+      </p:grpSpPr>
+      <p:sp>
+        <p:nvSpPr>
+          <p:cNvPr id="19" name="Стрелка углом 18"/>
+          <p:cNvSpPr/>
+          <p:nvPr/>
+        </p:nvSpPr>
+        <p:spPr>
+          <a:xfrm rot="16200000" flipH="1">
+            <a:off x="2028283" y="-75953"/>
+            <a:ext cx="746012" cy="2139297"/>
+          </a:xfrm>
+          <a:prstGeom prst="bentArrow">
+            <a:avLst/>
+          </a:prstGeom>
+        </p:spPr>
+        <p:style>
+          <a:lnRef idx="2">
+            <a:schemeClr val="accent1">
+              <a:shade val="50000"/>
+            </a:schemeClr>
+          </a:lnRef>
+          <a:fillRef idx="1">
+            <a:schemeClr val="accent1"/>
+          </a:fillRef>
+          <a:effectRef idx="0">
+            <a:schemeClr val="accent1"/>
+          </a:effectRef>
+          <a:fontRef idx="minor">
+            <a:schemeClr val="lt1"/>
+          </a:fontRef>
+        </p:style>
+        <p:txBody>
+          <a:bodyPr rtlCol="0" anchor="ctr"/>
+          <a:lstStyle/>
+          <a:p>
+            <a:pPr algn="ctr"/>
+            <a:endParaRPr lang="ru-RU">
+              <a:solidFill>
+                <a:schemeClr val="tx1"/>
+              </a:solidFill>
+            </a:endParaRPr>
+          </a:p>
+        </p:txBody>
+      </p:sp>
+      <p:sp>
+        <p:nvSpPr>
+          <p:cNvPr id="3" name="Прямоугольник 2"/>
+          <p:cNvSpPr/>
+          <p:nvPr/>
+        </p:nvSpPr>
+        <p:spPr>
+          <a:xfrm>
+            <a:off x="954087" y="1392199"/>
+            <a:ext cx="7235825" cy="5132425"/>
+          </a:xfrm>
+          <a:prstGeom prst="rect">
+            <a:avLst/>
+          </a:prstGeom>
+          <a:noFill/>
+          <a:ln w="38100">
+            <a:solidFill>
+              <a:schemeClr val="tx1"/>
+            </a:solidFill>
+            <a:prstDash val="lgDash"/>
+          </a:ln>
+        </p:spPr>
+        <p:style>
+          <a:lnRef idx="2">
+            <a:schemeClr val="accent1"/>
+          </a:lnRef>
+          <a:fillRef idx="1">
+            <a:schemeClr val="lt1"/>
+          </a:fillRef>
+          <a:effectRef idx="0">
+            <a:schemeClr val="accent1"/>
+          </a:effectRef>
+          <a:fontRef idx="minor">
+            <a:schemeClr val="dk1"/>
+          </a:fontRef>
+        </p:style>
+        <p:txBody>
+          <a:bodyPr rtlCol="0" anchor="t"/>
+          <a:lstStyle/>
+          <a:p>
+            <a:r>
+              <a:rPr lang="en-US" sz="2400" dirty="0" smtClean="0">
+                <a:solidFill>
+                  <a:schemeClr val="tx1"/>
+                </a:solidFill>
+              </a:rPr>
+              <a:t>Provider</a:t>
+            </a:r>
+            <a:endParaRPr lang="ru-RU" sz="2400" dirty="0">
+              <a:solidFill>
+                <a:schemeClr val="tx1"/>
+              </a:solidFill>
+            </a:endParaRPr>
+          </a:p>
+        </p:txBody>
+      </p:sp>
+      <p:sp>
+        <p:nvSpPr>
+          <p:cNvPr id="2" name="Прямоугольник 1"/>
+          <p:cNvSpPr/>
+          <p:nvPr/>
+        </p:nvSpPr>
+        <p:spPr>
+          <a:xfrm>
+            <a:off x="2843808" y="3428999"/>
+            <a:ext cx="4968552" cy="2879725"/>
+          </a:xfrm>
+          <a:prstGeom prst="rect">
+            <a:avLst/>
+          </a:prstGeom>
+          <a:pattFill prst="zigZag">
+            <a:fgClr>
+              <a:schemeClr val="accent1"/>
+            </a:fgClr>
+            <a:bgClr>
+              <a:schemeClr val="bg1"/>
+            </a:bgClr>
+          </a:pattFill>
+          <a:ln w="38100">
+            <a:solidFill>
+              <a:schemeClr val="tx1"/>
+            </a:solidFill>
+            <a:prstDash val="lgDash"/>
+          </a:ln>
+        </p:spPr>
+        <p:style>
+          <a:lnRef idx="2">
+            <a:schemeClr val="accent1"/>
+          </a:lnRef>
+          <a:fillRef idx="1">
+            <a:schemeClr val="lt1"/>
+          </a:fillRef>
+          <a:effectRef idx="0">
+            <a:schemeClr val="accent1"/>
+          </a:effectRef>
+          <a:fontRef idx="minor">
+            <a:schemeClr val="dk1"/>
+          </a:fontRef>
+        </p:style>
+        <p:txBody>
+          <a:bodyPr rtlCol="0" anchor="t"/>
+          <a:lstStyle/>
+          <a:p>
+            <a:r>
+              <a:rPr lang="en-US" sz="2400" dirty="0" smtClean="0">
+                <a:solidFill>
+                  <a:schemeClr val="tx1"/>
+                </a:solidFill>
+              </a:rPr>
+              <a:t>Container</a:t>
+            </a:r>
+            <a:endParaRPr lang="ru-RU" sz="2400" dirty="0">
+              <a:solidFill>
+                <a:schemeClr val="tx1"/>
+              </a:solidFill>
+            </a:endParaRPr>
+          </a:p>
+        </p:txBody>
+      </p:sp>
+      <p:sp>
+        <p:nvSpPr>
+          <p:cNvPr id="6" name="Скругленный прямоугольник 5"/>
+          <p:cNvSpPr/>
+          <p:nvPr/>
+        </p:nvSpPr>
+        <p:spPr>
+          <a:xfrm>
+            <a:off x="3492000" y="333375"/>
+            <a:ext cx="2160000" cy="720000"/>
+          </a:xfrm>
+          <a:prstGeom prst="roundRect">
+            <a:avLst/>
+          </a:prstGeom>
+          <a:pattFill prst="zigZag">
+            <a:fgClr>
+              <a:schemeClr val="accent1"/>
+            </a:fgClr>
+            <a:bgClr>
+              <a:schemeClr val="bg1"/>
+            </a:bgClr>
+          </a:pattFill>
+          <a:ln w="38100">
+            <a:solidFill>
+              <a:schemeClr val="tx1"/>
+            </a:solidFill>
+          </a:ln>
+        </p:spPr>
+        <p:style>
+          <a:lnRef idx="2">
+            <a:schemeClr val="accent1"/>
+          </a:lnRef>
+          <a:fillRef idx="1">
+            <a:schemeClr val="lt1"/>
+          </a:fillRef>
+          <a:effectRef idx="0">
+            <a:schemeClr val="accent1"/>
+          </a:effectRef>
+          <a:fontRef idx="minor">
+            <a:schemeClr val="dk1"/>
+          </a:fontRef>
+        </p:style>
+        <p:txBody>
+          <a:bodyPr rtlCol="0" anchor="ctr"/>
+          <a:lstStyle/>
+          <a:p>
+            <a:pPr algn="ctr"/>
+            <a:r>
+              <a:rPr lang="en-US" sz="2400" dirty="0" smtClean="0">
+                <a:solidFill>
+                  <a:schemeClr val="tx1"/>
+                </a:solidFill>
+              </a:rPr>
+              <a:t>Store</a:t>
+            </a:r>
+            <a:endParaRPr lang="ru-RU" sz="2400" dirty="0">
+              <a:solidFill>
+                <a:schemeClr val="tx1"/>
+              </a:solidFill>
+            </a:endParaRPr>
+          </a:p>
+        </p:txBody>
+      </p:sp>
+      <p:sp>
+        <p:nvSpPr>
+          <p:cNvPr id="8" name="Прямоугольник 7"/>
+          <p:cNvSpPr/>
+          <p:nvPr/>
+        </p:nvSpPr>
+        <p:spPr>
+          <a:xfrm>
+            <a:off x="6299133" y="869261"/>
+            <a:ext cx="1044117" cy="461665"/>
+          </a:xfrm>
+          <a:prstGeom prst="rect">
+            <a:avLst/>
+          </a:prstGeom>
+          <a:noFill/>
+          <a:ln>
+            <a:noFill/>
+          </a:ln>
+        </p:spPr>
+        <p:style>
+          <a:lnRef idx="0">
+            <a:scrgbClr r="0" g="0" b="0"/>
+          </a:lnRef>
+          <a:fillRef idx="0">
+            <a:scrgbClr r="0" g="0" b="0"/>
+          </a:fillRef>
+          <a:effectRef idx="0">
+            <a:scrgbClr r="0" g="0" b="0"/>
+          </a:effectRef>
+          <a:fontRef idx="minor">
+            <a:schemeClr val="accent1"/>
+          </a:fontRef>
+        </p:style>
+        <p:txBody>
+          <a:bodyPr rtlCol="0" anchor="ctr">
+            <a:spAutoFit/>
+          </a:bodyPr>
+          <a:lstStyle/>
+          <a:p>
+            <a:pPr algn="ctr"/>
+            <a:r>
+              <a:rPr lang="en-US" sz="2400" i="1" dirty="0" smtClean="0"/>
+              <a:t>action</a:t>
+            </a:r>
+            <a:endParaRPr lang="ru-RU" sz="2400" i="1" dirty="0"/>
+          </a:p>
+        </p:txBody>
+      </p:sp>
+      <p:sp>
+        <p:nvSpPr>
+          <p:cNvPr id="11" name="Выгнутая вниз стрелка 10"/>
+          <p:cNvSpPr/>
+          <p:nvPr/>
+        </p:nvSpPr>
+        <p:spPr>
+          <a:xfrm rot="13783328">
+            <a:off x="5351856" y="763136"/>
+            <a:ext cx="3893665" cy="1207129"/>
+          </a:xfrm>
+          <a:prstGeom prst="curvedUpArrow">
+            <a:avLst>
+              <a:gd name="adj1" fmla="val 12950"/>
+              <a:gd name="adj2" fmla="val 30280"/>
+              <a:gd name="adj3" fmla="val 16585"/>
+            </a:avLst>
+          </a:prstGeom>
+        </p:spPr>
+        <p:style>
+          <a:lnRef idx="2">
+            <a:schemeClr val="accent1">
+              <a:shade val="50000"/>
+            </a:schemeClr>
+          </a:lnRef>
+          <a:fillRef idx="1">
+            <a:schemeClr val="accent1"/>
+          </a:fillRef>
+          <a:effectRef idx="0">
+            <a:schemeClr val="accent1"/>
+          </a:effectRef>
+          <a:fontRef idx="minor">
+            <a:schemeClr val="lt1"/>
+          </a:fontRef>
+        </p:style>
+        <p:txBody>
+          <a:bodyPr rtlCol="0" anchor="ctr"/>
+          <a:lstStyle/>
+          <a:p>
+            <a:pPr algn="ctr"/>
+            <a:endParaRPr lang="ru-RU">
+              <a:solidFill>
+                <a:schemeClr val="tx1"/>
+              </a:solidFill>
+            </a:endParaRPr>
+          </a:p>
+        </p:txBody>
+      </p:sp>
+      <p:sp>
+        <p:nvSpPr>
+          <p:cNvPr id="12" name="Выгнутая вниз стрелка 11"/>
+          <p:cNvSpPr/>
+          <p:nvPr/>
+        </p:nvSpPr>
+        <p:spPr>
+          <a:xfrm rot="13783328">
+            <a:off x="5684554" y="649312"/>
+            <a:ext cx="2499566" cy="1179759"/>
+          </a:xfrm>
+          <a:prstGeom prst="curvedUpArrow">
+            <a:avLst>
+              <a:gd name="adj1" fmla="val 14740"/>
+              <a:gd name="adj2" fmla="val 37741"/>
+              <a:gd name="adj3" fmla="val 18130"/>
+            </a:avLst>
+          </a:prstGeom>
+        </p:spPr>
+        <p:style>
+          <a:lnRef idx="2">
+            <a:schemeClr val="accent1">
+              <a:shade val="50000"/>
+            </a:schemeClr>
+          </a:lnRef>
+          <a:fillRef idx="1">
+            <a:schemeClr val="accent1"/>
+          </a:fillRef>
+          <a:effectRef idx="0">
+            <a:schemeClr val="accent1"/>
+          </a:effectRef>
+          <a:fontRef idx="minor">
+            <a:schemeClr val="lt1"/>
+          </a:fontRef>
+        </p:style>
+        <p:txBody>
+          <a:bodyPr rtlCol="0" anchor="ctr"/>
+          <a:lstStyle/>
+          <a:p>
+            <a:pPr algn="ctr"/>
+            <a:endParaRPr lang="ru-RU">
+              <a:solidFill>
+                <a:schemeClr val="tx1"/>
+              </a:solidFill>
+            </a:endParaRPr>
+          </a:p>
+        </p:txBody>
+      </p:sp>
+      <p:sp>
+        <p:nvSpPr>
+          <p:cNvPr id="15" name="Прямоугольник 14"/>
+          <p:cNvSpPr/>
+          <p:nvPr/>
+        </p:nvSpPr>
+        <p:spPr>
+          <a:xfrm>
+            <a:off x="5553700" y="2510235"/>
+            <a:ext cx="1575792" cy="439836"/>
+          </a:xfrm>
+          <a:prstGeom prst="rect">
+            <a:avLst/>
+          </a:prstGeom>
+          <a:pattFill prst="zigZag">
+            <a:fgClr>
+              <a:schemeClr val="accent1"/>
+            </a:fgClr>
+            <a:bgClr>
+              <a:schemeClr val="bg1"/>
+            </a:bgClr>
+          </a:pattFill>
+          <a:ln w="38100">
+            <a:solidFill>
+              <a:schemeClr val="tx1"/>
+            </a:solidFill>
+            <a:prstDash val="lgDash"/>
+          </a:ln>
+        </p:spPr>
+        <p:style>
+          <a:lnRef idx="2">
+            <a:schemeClr val="accent1"/>
+          </a:lnRef>
+          <a:fillRef idx="1">
+            <a:schemeClr val="lt1"/>
+          </a:fillRef>
+          <a:effectRef idx="0">
+            <a:schemeClr val="accent1"/>
+          </a:effectRef>
+          <a:fontRef idx="minor">
+            <a:schemeClr val="dk1"/>
+          </a:fontRef>
+        </p:style>
+        <p:txBody>
+          <a:bodyPr rtlCol="0" anchor="t"/>
+          <a:lstStyle/>
+          <a:p>
+            <a:r>
+              <a:rPr lang="en-US" sz="2400" dirty="0" smtClean="0">
+                <a:solidFill>
+                  <a:schemeClr val="tx1"/>
+                </a:solidFill>
+              </a:rPr>
+              <a:t>Container</a:t>
+            </a:r>
+            <a:endParaRPr lang="ru-RU" sz="2400" dirty="0">
+              <a:solidFill>
+                <a:schemeClr val="tx1"/>
+              </a:solidFill>
+            </a:endParaRPr>
+          </a:p>
+        </p:txBody>
+      </p:sp>
+      <p:sp>
+        <p:nvSpPr>
+          <p:cNvPr id="23" name="Молния 22"/>
+          <p:cNvSpPr/>
+          <p:nvPr/>
+        </p:nvSpPr>
+        <p:spPr>
+          <a:xfrm rot="20744112">
+            <a:off x="1384805" y="1740837"/>
+            <a:ext cx="1324627" cy="1996330"/>
+          </a:xfrm>
+          <a:prstGeom prst="lightningBolt">
+            <a:avLst/>
+          </a:prstGeom>
+        </p:spPr>
+        <p:style>
+          <a:lnRef idx="2">
+            <a:schemeClr val="accent1"/>
+          </a:lnRef>
+          <a:fillRef idx="1">
+            <a:schemeClr val="lt1"/>
+          </a:fillRef>
+          <a:effectRef idx="0">
+            <a:schemeClr val="accent1"/>
+          </a:effectRef>
+          <a:fontRef idx="minor">
+            <a:schemeClr val="dk1"/>
+          </a:fontRef>
+        </p:style>
+        <p:txBody>
+          <a:bodyPr rtlCol="0" anchor="ctr"/>
+          <a:lstStyle/>
+          <a:p>
+            <a:pPr algn="ctr"/>
+            <a:endParaRPr lang="ru-RU"/>
+          </a:p>
+        </p:txBody>
+      </p:sp>
+      <p:sp>
+        <p:nvSpPr>
+          <p:cNvPr id="24" name="Молния 23"/>
+          <p:cNvSpPr/>
+          <p:nvPr/>
+        </p:nvSpPr>
+        <p:spPr>
+          <a:xfrm rot="17617048">
+            <a:off x="3260644" y="598490"/>
+            <a:ext cx="1090541" cy="3575211"/>
+          </a:xfrm>
+          <a:prstGeom prst="lightningBolt">
+            <a:avLst/>
+          </a:prstGeom>
+        </p:spPr>
+        <p:style>
+          <a:lnRef idx="2">
+            <a:schemeClr val="accent1"/>
+          </a:lnRef>
+          <a:fillRef idx="1">
+            <a:schemeClr val="lt1"/>
+          </a:fillRef>
+          <a:effectRef idx="0">
+            <a:schemeClr val="accent1"/>
+          </a:effectRef>
+          <a:fontRef idx="minor">
+            <a:schemeClr val="dk1"/>
+          </a:fontRef>
+        </p:style>
+        <p:txBody>
+          <a:bodyPr rtlCol="0" anchor="ctr"/>
+          <a:lstStyle/>
+          <a:p>
+            <a:pPr algn="ctr"/>
+            <a:endParaRPr lang="ru-RU"/>
+          </a:p>
+        </p:txBody>
+      </p:sp>
+      <p:sp>
+        <p:nvSpPr>
+          <p:cNvPr id="26" name="Прямоугольник 25"/>
+          <p:cNvSpPr/>
+          <p:nvPr/>
+        </p:nvSpPr>
+        <p:spPr>
+          <a:xfrm>
+            <a:off x="5436096" y="4770653"/>
+            <a:ext cx="1862592" cy="458207"/>
+          </a:xfrm>
+          <a:prstGeom prst="rect">
+            <a:avLst/>
+          </a:prstGeom>
+          <a:noFill/>
+          <a:ln w="38100">
+            <a:solidFill>
+              <a:schemeClr val="tx1"/>
+            </a:solidFill>
+            <a:prstDash val="lgDash"/>
+          </a:ln>
+        </p:spPr>
+        <p:style>
+          <a:lnRef idx="2">
+            <a:schemeClr val="accent1"/>
+          </a:lnRef>
+          <a:fillRef idx="1">
+            <a:schemeClr val="lt1"/>
+          </a:fillRef>
+          <a:effectRef idx="0">
+            <a:schemeClr val="accent1"/>
+          </a:effectRef>
+          <a:fontRef idx="minor">
+            <a:schemeClr val="dk1"/>
+          </a:fontRef>
+        </p:style>
+        <p:txBody>
+          <a:bodyPr rtlCol="0" anchor="t"/>
+          <a:lstStyle/>
+          <a:p>
+            <a:pPr algn="ctr"/>
+            <a:r>
+              <a:rPr lang="en-US" sz="2400" dirty="0" smtClean="0">
+                <a:solidFill>
+                  <a:schemeClr val="tx1"/>
+                </a:solidFill>
+              </a:rPr>
+              <a:t>Component</a:t>
+            </a:r>
+            <a:endParaRPr lang="ru-RU" sz="2400" dirty="0">
+              <a:solidFill>
+                <a:schemeClr val="tx1"/>
+              </a:solidFill>
+            </a:endParaRPr>
+          </a:p>
+        </p:txBody>
+      </p:sp>
+    </p:spTree>
+    <p:extLst>
+      <p:ext uri="{BB962C8B-B14F-4D97-AF65-F5344CB8AC3E}">
+        <p14:creationId xmlns:p14="http://schemas.microsoft.com/office/powerpoint/2010/main" val="343542026"/>
+      </p:ext>
+    </p:extLst>
+  </p:cSld>
+  <p:clrMapOvr>
+    <a:masterClrMapping/>
+  </p:clrMapOvr>
+</p:sld>
+</file>
+
 <file path=ppt/slides/slide2.xml><?xml version="1.0" encoding="utf-8"?>
 <p:sld xmlns:a="http://schemas.openxmlformats.org/drawingml/2006/main" xmlns:r="http://schemas.openxmlformats.org/officeDocument/2006/relationships" xmlns:p="http://schemas.openxmlformats.org/presentationml/2006/main">
   <p:cSld>
@@ -6766,6 +9724,693 @@
       </p:par>
     </p:tnLst>
   </p:timing>
+</p:sld>
+</file>
+
+<file path=ppt/slides/slide20.xml><?xml version="1.0" encoding="utf-8"?>
+<p:sld xmlns:a="http://schemas.openxmlformats.org/drawingml/2006/main" xmlns:r="http://schemas.openxmlformats.org/officeDocument/2006/relationships" xmlns:p="http://schemas.openxmlformats.org/presentationml/2006/main">
+  <p:cSld>
+    <p:spTree>
+      <p:nvGrpSpPr>
+        <p:cNvPr id="1" name=""/>
+        <p:cNvGrpSpPr/>
+        <p:nvPr/>
+      </p:nvGrpSpPr>
+      <p:grpSpPr>
+        <a:xfrm>
+          <a:off x="0" y="0"/>
+          <a:ext cx="0" cy="0"/>
+          <a:chOff x="0" y="0"/>
+          <a:chExt cx="0" cy="0"/>
+        </a:xfrm>
+      </p:grpSpPr>
+      <p:sp>
+        <p:nvSpPr>
+          <p:cNvPr id="19" name="Стрелка углом 18"/>
+          <p:cNvSpPr/>
+          <p:nvPr/>
+        </p:nvSpPr>
+        <p:spPr>
+          <a:xfrm rot="16200000" flipH="1">
+            <a:off x="2028283" y="-75953"/>
+            <a:ext cx="746012" cy="2139297"/>
+          </a:xfrm>
+          <a:prstGeom prst="bentArrow">
+            <a:avLst/>
+          </a:prstGeom>
+        </p:spPr>
+        <p:style>
+          <a:lnRef idx="2">
+            <a:schemeClr val="accent1">
+              <a:shade val="50000"/>
+            </a:schemeClr>
+          </a:lnRef>
+          <a:fillRef idx="1">
+            <a:schemeClr val="accent1"/>
+          </a:fillRef>
+          <a:effectRef idx="0">
+            <a:schemeClr val="accent1"/>
+          </a:effectRef>
+          <a:fontRef idx="minor">
+            <a:schemeClr val="lt1"/>
+          </a:fontRef>
+        </p:style>
+        <p:txBody>
+          <a:bodyPr rtlCol="0" anchor="ctr"/>
+          <a:lstStyle/>
+          <a:p>
+            <a:pPr algn="ctr"/>
+            <a:endParaRPr lang="ru-RU">
+              <a:solidFill>
+                <a:schemeClr val="tx1"/>
+              </a:solidFill>
+            </a:endParaRPr>
+          </a:p>
+        </p:txBody>
+      </p:sp>
+      <p:sp>
+        <p:nvSpPr>
+          <p:cNvPr id="3" name="Прямоугольник 2"/>
+          <p:cNvSpPr/>
+          <p:nvPr/>
+        </p:nvSpPr>
+        <p:spPr>
+          <a:xfrm>
+            <a:off x="954087" y="1392199"/>
+            <a:ext cx="7235825" cy="5132425"/>
+          </a:xfrm>
+          <a:prstGeom prst="rect">
+            <a:avLst/>
+          </a:prstGeom>
+          <a:ln w="38100">
+            <a:solidFill>
+              <a:schemeClr val="tx1"/>
+            </a:solidFill>
+            <a:prstDash val="lgDash"/>
+          </a:ln>
+        </p:spPr>
+        <p:style>
+          <a:lnRef idx="2">
+            <a:schemeClr val="accent1"/>
+          </a:lnRef>
+          <a:fillRef idx="1">
+            <a:schemeClr val="lt1"/>
+          </a:fillRef>
+          <a:effectRef idx="0">
+            <a:schemeClr val="accent1"/>
+          </a:effectRef>
+          <a:fontRef idx="minor">
+            <a:schemeClr val="dk1"/>
+          </a:fontRef>
+        </p:style>
+        <p:txBody>
+          <a:bodyPr rtlCol="0" anchor="t"/>
+          <a:lstStyle/>
+          <a:p>
+            <a:r>
+              <a:rPr lang="en-US" sz="2400" dirty="0" smtClean="0">
+                <a:solidFill>
+                  <a:schemeClr val="tx1"/>
+                </a:solidFill>
+              </a:rPr>
+              <a:t>Provider</a:t>
+            </a:r>
+            <a:endParaRPr lang="ru-RU" sz="2400" dirty="0">
+              <a:solidFill>
+                <a:schemeClr val="tx1"/>
+              </a:solidFill>
+            </a:endParaRPr>
+          </a:p>
+        </p:txBody>
+      </p:sp>
+      <p:sp>
+        <p:nvSpPr>
+          <p:cNvPr id="2" name="Прямоугольник 1"/>
+          <p:cNvSpPr/>
+          <p:nvPr/>
+        </p:nvSpPr>
+        <p:spPr>
+          <a:xfrm>
+            <a:off x="2843808" y="3428999"/>
+            <a:ext cx="4968552" cy="2879725"/>
+          </a:xfrm>
+          <a:prstGeom prst="rect">
+            <a:avLst/>
+          </a:prstGeom>
+          <a:pattFill prst="zigZag">
+            <a:fgClr>
+              <a:schemeClr val="accent1"/>
+            </a:fgClr>
+            <a:bgClr>
+              <a:schemeClr val="bg1"/>
+            </a:bgClr>
+          </a:pattFill>
+          <a:ln w="38100">
+            <a:solidFill>
+              <a:schemeClr val="tx1"/>
+            </a:solidFill>
+            <a:prstDash val="lgDash"/>
+          </a:ln>
+        </p:spPr>
+        <p:style>
+          <a:lnRef idx="2">
+            <a:schemeClr val="accent1"/>
+          </a:lnRef>
+          <a:fillRef idx="1">
+            <a:schemeClr val="lt1"/>
+          </a:fillRef>
+          <a:effectRef idx="0">
+            <a:schemeClr val="accent1"/>
+          </a:effectRef>
+          <a:fontRef idx="minor">
+            <a:schemeClr val="dk1"/>
+          </a:fontRef>
+        </p:style>
+        <p:txBody>
+          <a:bodyPr rtlCol="0" anchor="t"/>
+          <a:lstStyle/>
+          <a:p>
+            <a:r>
+              <a:rPr lang="en-US" sz="2400" dirty="0" smtClean="0">
+                <a:solidFill>
+                  <a:schemeClr val="tx1"/>
+                </a:solidFill>
+              </a:rPr>
+              <a:t>Container</a:t>
+            </a:r>
+            <a:endParaRPr lang="ru-RU" sz="2400" dirty="0">
+              <a:solidFill>
+                <a:schemeClr val="tx1"/>
+              </a:solidFill>
+            </a:endParaRPr>
+          </a:p>
+        </p:txBody>
+      </p:sp>
+      <p:sp>
+        <p:nvSpPr>
+          <p:cNvPr id="7" name="Скругленный прямоугольник 6"/>
+          <p:cNvSpPr/>
+          <p:nvPr/>
+        </p:nvSpPr>
+        <p:spPr>
+          <a:xfrm>
+            <a:off x="3059832" y="3869588"/>
+            <a:ext cx="4536504" cy="2223708"/>
+          </a:xfrm>
+          <a:prstGeom prst="roundRect">
+            <a:avLst/>
+          </a:prstGeom>
+          <a:ln w="38100"/>
+        </p:spPr>
+        <p:style>
+          <a:lnRef idx="2">
+            <a:schemeClr val="dk1"/>
+          </a:lnRef>
+          <a:fillRef idx="1">
+            <a:schemeClr val="lt1"/>
+          </a:fillRef>
+          <a:effectRef idx="0">
+            <a:schemeClr val="dk1"/>
+          </a:effectRef>
+          <a:fontRef idx="minor">
+            <a:schemeClr val="dk1"/>
+          </a:fontRef>
+        </p:style>
+        <p:txBody>
+          <a:bodyPr rtlCol="0" anchor="t"/>
+          <a:lstStyle/>
+          <a:p>
+            <a:r>
+              <a:rPr lang="en-US" sz="2400" dirty="0" err="1"/>
+              <a:t>selectProps</a:t>
+            </a:r>
+            <a:endParaRPr lang="ru-RU" sz="2400" dirty="0"/>
+          </a:p>
+        </p:txBody>
+      </p:sp>
+      <p:sp>
+        <p:nvSpPr>
+          <p:cNvPr id="4" name="Прямоугольник 3"/>
+          <p:cNvSpPr/>
+          <p:nvPr/>
+        </p:nvSpPr>
+        <p:spPr>
+          <a:xfrm>
+            <a:off x="5436096" y="4770653"/>
+            <a:ext cx="1862592" cy="458207"/>
+          </a:xfrm>
+          <a:prstGeom prst="rect">
+            <a:avLst/>
+          </a:prstGeom>
+          <a:noFill/>
+          <a:ln w="38100">
+            <a:solidFill>
+              <a:schemeClr val="tx1"/>
+            </a:solidFill>
+            <a:prstDash val="lgDash"/>
+          </a:ln>
+        </p:spPr>
+        <p:style>
+          <a:lnRef idx="2">
+            <a:schemeClr val="accent1"/>
+          </a:lnRef>
+          <a:fillRef idx="1">
+            <a:schemeClr val="lt1"/>
+          </a:fillRef>
+          <a:effectRef idx="0">
+            <a:schemeClr val="accent1"/>
+          </a:effectRef>
+          <a:fontRef idx="minor">
+            <a:schemeClr val="dk1"/>
+          </a:fontRef>
+        </p:style>
+        <p:txBody>
+          <a:bodyPr rtlCol="0" anchor="t"/>
+          <a:lstStyle/>
+          <a:p>
+            <a:pPr algn="ctr"/>
+            <a:r>
+              <a:rPr lang="en-US" sz="2400" dirty="0" smtClean="0">
+                <a:solidFill>
+                  <a:schemeClr val="tx1"/>
+                </a:solidFill>
+              </a:rPr>
+              <a:t>Component</a:t>
+            </a:r>
+            <a:endParaRPr lang="ru-RU" sz="2400" dirty="0">
+              <a:solidFill>
+                <a:schemeClr val="tx1"/>
+              </a:solidFill>
+            </a:endParaRPr>
+          </a:p>
+        </p:txBody>
+      </p:sp>
+      <p:sp>
+        <p:nvSpPr>
+          <p:cNvPr id="6" name="Скругленный прямоугольник 5"/>
+          <p:cNvSpPr/>
+          <p:nvPr/>
+        </p:nvSpPr>
+        <p:spPr>
+          <a:xfrm>
+            <a:off x="3492000" y="333375"/>
+            <a:ext cx="2160000" cy="720000"/>
+          </a:xfrm>
+          <a:prstGeom prst="roundRect">
+            <a:avLst/>
+          </a:prstGeom>
+          <a:pattFill prst="zigZag">
+            <a:fgClr>
+              <a:schemeClr val="accent1"/>
+            </a:fgClr>
+            <a:bgClr>
+              <a:schemeClr val="bg1"/>
+            </a:bgClr>
+          </a:pattFill>
+          <a:ln w="38100">
+            <a:solidFill>
+              <a:schemeClr val="tx1"/>
+            </a:solidFill>
+          </a:ln>
+        </p:spPr>
+        <p:style>
+          <a:lnRef idx="2">
+            <a:schemeClr val="accent1"/>
+          </a:lnRef>
+          <a:fillRef idx="1">
+            <a:schemeClr val="lt1"/>
+          </a:fillRef>
+          <a:effectRef idx="0">
+            <a:schemeClr val="accent1"/>
+          </a:effectRef>
+          <a:fontRef idx="minor">
+            <a:schemeClr val="dk1"/>
+          </a:fontRef>
+        </p:style>
+        <p:txBody>
+          <a:bodyPr rtlCol="0" anchor="ctr"/>
+          <a:lstStyle/>
+          <a:p>
+            <a:pPr algn="ctr"/>
+            <a:r>
+              <a:rPr lang="en-US" sz="2400" dirty="0" smtClean="0">
+                <a:solidFill>
+                  <a:schemeClr val="tx1"/>
+                </a:solidFill>
+              </a:rPr>
+              <a:t>Store</a:t>
+            </a:r>
+            <a:endParaRPr lang="ru-RU" sz="2400" dirty="0">
+              <a:solidFill>
+                <a:schemeClr val="tx1"/>
+              </a:solidFill>
+            </a:endParaRPr>
+          </a:p>
+        </p:txBody>
+      </p:sp>
+      <p:sp>
+        <p:nvSpPr>
+          <p:cNvPr id="8" name="Прямоугольник 7"/>
+          <p:cNvSpPr/>
+          <p:nvPr/>
+        </p:nvSpPr>
+        <p:spPr>
+          <a:xfrm>
+            <a:off x="6299133" y="869261"/>
+            <a:ext cx="1044117" cy="461665"/>
+          </a:xfrm>
+          <a:prstGeom prst="rect">
+            <a:avLst/>
+          </a:prstGeom>
+          <a:noFill/>
+          <a:ln>
+            <a:noFill/>
+          </a:ln>
+        </p:spPr>
+        <p:style>
+          <a:lnRef idx="0">
+            <a:scrgbClr r="0" g="0" b="0"/>
+          </a:lnRef>
+          <a:fillRef idx="0">
+            <a:scrgbClr r="0" g="0" b="0"/>
+          </a:fillRef>
+          <a:effectRef idx="0">
+            <a:scrgbClr r="0" g="0" b="0"/>
+          </a:effectRef>
+          <a:fontRef idx="minor">
+            <a:schemeClr val="accent1"/>
+          </a:fontRef>
+        </p:style>
+        <p:txBody>
+          <a:bodyPr rtlCol="0" anchor="ctr">
+            <a:spAutoFit/>
+          </a:bodyPr>
+          <a:lstStyle/>
+          <a:p>
+            <a:pPr algn="ctr"/>
+            <a:r>
+              <a:rPr lang="en-US" sz="2400" i="1" dirty="0" smtClean="0"/>
+              <a:t>action</a:t>
+            </a:r>
+            <a:endParaRPr lang="ru-RU" sz="2400" i="1" dirty="0"/>
+          </a:p>
+        </p:txBody>
+      </p:sp>
+      <p:sp>
+        <p:nvSpPr>
+          <p:cNvPr id="11" name="Выгнутая вниз стрелка 10"/>
+          <p:cNvSpPr/>
+          <p:nvPr/>
+        </p:nvSpPr>
+        <p:spPr>
+          <a:xfrm rot="13783328">
+            <a:off x="5351856" y="763136"/>
+            <a:ext cx="3893665" cy="1207129"/>
+          </a:xfrm>
+          <a:prstGeom prst="curvedUpArrow">
+            <a:avLst>
+              <a:gd name="adj1" fmla="val 12950"/>
+              <a:gd name="adj2" fmla="val 30280"/>
+              <a:gd name="adj3" fmla="val 16585"/>
+            </a:avLst>
+          </a:prstGeom>
+        </p:spPr>
+        <p:style>
+          <a:lnRef idx="2">
+            <a:schemeClr val="accent1">
+              <a:shade val="50000"/>
+            </a:schemeClr>
+          </a:lnRef>
+          <a:fillRef idx="1">
+            <a:schemeClr val="accent1"/>
+          </a:fillRef>
+          <a:effectRef idx="0">
+            <a:schemeClr val="accent1"/>
+          </a:effectRef>
+          <a:fontRef idx="minor">
+            <a:schemeClr val="lt1"/>
+          </a:fontRef>
+        </p:style>
+        <p:txBody>
+          <a:bodyPr rtlCol="0" anchor="ctr"/>
+          <a:lstStyle/>
+          <a:p>
+            <a:pPr algn="ctr"/>
+            <a:endParaRPr lang="ru-RU">
+              <a:solidFill>
+                <a:schemeClr val="tx1"/>
+              </a:solidFill>
+            </a:endParaRPr>
+          </a:p>
+        </p:txBody>
+      </p:sp>
+      <p:sp>
+        <p:nvSpPr>
+          <p:cNvPr id="12" name="Выгнутая вниз стрелка 11"/>
+          <p:cNvSpPr/>
+          <p:nvPr/>
+        </p:nvSpPr>
+        <p:spPr>
+          <a:xfrm rot="13783328">
+            <a:off x="5684554" y="649312"/>
+            <a:ext cx="2499566" cy="1179759"/>
+          </a:xfrm>
+          <a:prstGeom prst="curvedUpArrow">
+            <a:avLst>
+              <a:gd name="adj1" fmla="val 14740"/>
+              <a:gd name="adj2" fmla="val 37741"/>
+              <a:gd name="adj3" fmla="val 18130"/>
+            </a:avLst>
+          </a:prstGeom>
+        </p:spPr>
+        <p:style>
+          <a:lnRef idx="2">
+            <a:schemeClr val="accent1">
+              <a:shade val="50000"/>
+            </a:schemeClr>
+          </a:lnRef>
+          <a:fillRef idx="1">
+            <a:schemeClr val="accent1"/>
+          </a:fillRef>
+          <a:effectRef idx="0">
+            <a:schemeClr val="accent1"/>
+          </a:effectRef>
+          <a:fontRef idx="minor">
+            <a:schemeClr val="lt1"/>
+          </a:fontRef>
+        </p:style>
+        <p:txBody>
+          <a:bodyPr rtlCol="0" anchor="ctr"/>
+          <a:lstStyle/>
+          <a:p>
+            <a:pPr algn="ctr"/>
+            <a:endParaRPr lang="ru-RU">
+              <a:solidFill>
+                <a:schemeClr val="tx1"/>
+              </a:solidFill>
+            </a:endParaRPr>
+          </a:p>
+        </p:txBody>
+      </p:sp>
+      <p:sp>
+        <p:nvSpPr>
+          <p:cNvPr id="15" name="Прямоугольник 14"/>
+          <p:cNvSpPr/>
+          <p:nvPr/>
+        </p:nvSpPr>
+        <p:spPr>
+          <a:xfrm>
+            <a:off x="5553700" y="2510235"/>
+            <a:ext cx="1575792" cy="439836"/>
+          </a:xfrm>
+          <a:prstGeom prst="rect">
+            <a:avLst/>
+          </a:prstGeom>
+          <a:pattFill prst="zigZag">
+            <a:fgClr>
+              <a:schemeClr val="accent1"/>
+            </a:fgClr>
+            <a:bgClr>
+              <a:schemeClr val="bg1"/>
+            </a:bgClr>
+          </a:pattFill>
+          <a:ln w="38100">
+            <a:solidFill>
+              <a:schemeClr val="tx1"/>
+            </a:solidFill>
+            <a:prstDash val="lgDash"/>
+          </a:ln>
+        </p:spPr>
+        <p:style>
+          <a:lnRef idx="2">
+            <a:schemeClr val="accent1"/>
+          </a:lnRef>
+          <a:fillRef idx="1">
+            <a:schemeClr val="lt1"/>
+          </a:fillRef>
+          <a:effectRef idx="0">
+            <a:schemeClr val="accent1"/>
+          </a:effectRef>
+          <a:fontRef idx="minor">
+            <a:schemeClr val="dk1"/>
+          </a:fontRef>
+        </p:style>
+        <p:txBody>
+          <a:bodyPr rtlCol="0" anchor="t"/>
+          <a:lstStyle/>
+          <a:p>
+            <a:r>
+              <a:rPr lang="en-US" sz="2400" dirty="0" smtClean="0">
+                <a:solidFill>
+                  <a:schemeClr val="tx1"/>
+                </a:solidFill>
+              </a:rPr>
+              <a:t>Container</a:t>
+            </a:r>
+            <a:endParaRPr lang="ru-RU" sz="2400" dirty="0">
+              <a:solidFill>
+                <a:schemeClr val="tx1"/>
+              </a:solidFill>
+            </a:endParaRPr>
+          </a:p>
+        </p:txBody>
+      </p:sp>
+      <p:sp>
+        <p:nvSpPr>
+          <p:cNvPr id="23" name="Молния 22"/>
+          <p:cNvSpPr/>
+          <p:nvPr/>
+        </p:nvSpPr>
+        <p:spPr>
+          <a:xfrm rot="20744112">
+            <a:off x="1384805" y="1740837"/>
+            <a:ext cx="1324627" cy="1996330"/>
+          </a:xfrm>
+          <a:prstGeom prst="lightningBolt">
+            <a:avLst/>
+          </a:prstGeom>
+        </p:spPr>
+        <p:style>
+          <a:lnRef idx="2">
+            <a:schemeClr val="accent1"/>
+          </a:lnRef>
+          <a:fillRef idx="1">
+            <a:schemeClr val="lt1"/>
+          </a:fillRef>
+          <a:effectRef idx="0">
+            <a:schemeClr val="accent1"/>
+          </a:effectRef>
+          <a:fontRef idx="minor">
+            <a:schemeClr val="dk1"/>
+          </a:fontRef>
+        </p:style>
+        <p:txBody>
+          <a:bodyPr rtlCol="0" anchor="ctr"/>
+          <a:lstStyle/>
+          <a:p>
+            <a:pPr algn="ctr"/>
+            <a:endParaRPr lang="ru-RU"/>
+          </a:p>
+        </p:txBody>
+      </p:sp>
+      <p:sp>
+        <p:nvSpPr>
+          <p:cNvPr id="24" name="Молния 23"/>
+          <p:cNvSpPr/>
+          <p:nvPr/>
+        </p:nvSpPr>
+        <p:spPr>
+          <a:xfrm rot="17617048">
+            <a:off x="3260644" y="598490"/>
+            <a:ext cx="1090541" cy="3575211"/>
+          </a:xfrm>
+          <a:prstGeom prst="lightningBolt">
+            <a:avLst/>
+          </a:prstGeom>
+        </p:spPr>
+        <p:style>
+          <a:lnRef idx="2">
+            <a:schemeClr val="accent1"/>
+          </a:lnRef>
+          <a:fillRef idx="1">
+            <a:schemeClr val="lt1"/>
+          </a:fillRef>
+          <a:effectRef idx="0">
+            <a:schemeClr val="accent1"/>
+          </a:effectRef>
+          <a:fontRef idx="minor">
+            <a:schemeClr val="dk1"/>
+          </a:fontRef>
+        </p:style>
+        <p:txBody>
+          <a:bodyPr rtlCol="0" anchor="ctr"/>
+          <a:lstStyle/>
+          <a:p>
+            <a:pPr algn="ctr"/>
+            <a:endParaRPr lang="ru-RU"/>
+          </a:p>
+        </p:txBody>
+      </p:sp>
+      <p:sp>
+        <p:nvSpPr>
+          <p:cNvPr id="10" name="Блок-схема: магнитный диск 9"/>
+          <p:cNvSpPr/>
+          <p:nvPr/>
+        </p:nvSpPr>
+        <p:spPr>
+          <a:xfrm>
+            <a:off x="3275856" y="4509716"/>
+            <a:ext cx="1587606" cy="1296144"/>
+          </a:xfrm>
+          <a:prstGeom prst="flowChartMagneticDisk">
+            <a:avLst/>
+          </a:prstGeom>
+          <a:ln w="38100"/>
+        </p:spPr>
+        <p:style>
+          <a:lnRef idx="2">
+            <a:schemeClr val="accent1"/>
+          </a:lnRef>
+          <a:fillRef idx="1">
+            <a:schemeClr val="lt1"/>
+          </a:fillRef>
+          <a:effectRef idx="0">
+            <a:schemeClr val="accent1"/>
+          </a:effectRef>
+          <a:fontRef idx="minor">
+            <a:schemeClr val="dk1"/>
+          </a:fontRef>
+        </p:style>
+        <p:txBody>
+          <a:bodyPr rtlCol="0" anchor="t"/>
+          <a:lstStyle/>
+          <a:p>
+            <a:pPr algn="ctr"/>
+            <a:r>
+              <a:rPr lang="en-US" dirty="0" smtClean="0"/>
+              <a:t>previous</a:t>
+            </a:r>
+            <a:br>
+              <a:rPr lang="en-US" dirty="0" smtClean="0"/>
+            </a:br>
+            <a:r>
+              <a:rPr lang="en-US" dirty="0" smtClean="0"/>
+              <a:t>props</a:t>
+            </a:r>
+            <a:endParaRPr lang="ru-RU" dirty="0"/>
+          </a:p>
+        </p:txBody>
+      </p:sp>
+    </p:spTree>
+    <p:extLst>
+      <p:ext uri="{BB962C8B-B14F-4D97-AF65-F5344CB8AC3E}">
+        <p14:creationId xmlns:p14="http://schemas.microsoft.com/office/powerpoint/2010/main" val="351365013"/>
+      </p:ext>
+    </p:extLst>
+  </p:cSld>
+  <p:clrMapOvr>
+    <a:masterClrMapping/>
+  </p:clrMapOvr>
 </p:sld>
 </file>
 
@@ -7137,15 +10782,7 @@
                   <a:schemeClr val="tx1"/>
                 </a:solidFill>
               </a:rPr>
-              <a:t>m</a:t>
-            </a:r>
-            <a:r>
-              <a:rPr lang="en-US" sz="2400" b="1" dirty="0" smtClean="0">
-                <a:solidFill>
-                  <a:schemeClr val="tx1"/>
-                </a:solidFill>
-              </a:rPr>
-              <a:t>iddleware</a:t>
+              <a:t>middleware</a:t>
             </a:r>
             <a:endParaRPr lang="ru-RU" sz="2400" b="1" dirty="0">
               <a:solidFill>
@@ -7574,15 +11211,7 @@
                   <a:schemeClr val="tx1"/>
                 </a:solidFill>
               </a:rPr>
-              <a:t>m</a:t>
-            </a:r>
-            <a:r>
-              <a:rPr lang="en-US" sz="2400" b="1" dirty="0" smtClean="0">
-                <a:solidFill>
-                  <a:schemeClr val="tx1"/>
-                </a:solidFill>
-              </a:rPr>
-              <a:t>iddleware</a:t>
+              <a:t>middleware</a:t>
             </a:r>
             <a:endParaRPr lang="ru-RU" sz="2400" b="1" dirty="0">
               <a:solidFill>
@@ -8102,15 +11731,7 @@
                   <a:schemeClr val="tx1"/>
                 </a:solidFill>
               </a:rPr>
-              <a:t>m</a:t>
-            </a:r>
-            <a:r>
-              <a:rPr lang="en-US" sz="2400" b="1" dirty="0" smtClean="0">
-                <a:solidFill>
-                  <a:schemeClr val="tx1"/>
-                </a:solidFill>
-              </a:rPr>
-              <a:t>iddleware</a:t>
+              <a:t>middleware</a:t>
             </a:r>
             <a:endParaRPr lang="ru-RU" sz="2400" b="1" dirty="0">
               <a:solidFill>
@@ -8664,15 +12285,7 @@
                   <a:schemeClr val="tx1"/>
                 </a:solidFill>
               </a:rPr>
-              <a:t>m</a:t>
-            </a:r>
-            <a:r>
-              <a:rPr lang="en-US" sz="2400" b="1" dirty="0" smtClean="0">
-                <a:solidFill>
-                  <a:schemeClr val="tx1"/>
-                </a:solidFill>
-              </a:rPr>
-              <a:t>iddleware</a:t>
+              <a:t>middleware</a:t>
             </a:r>
             <a:endParaRPr lang="ru-RU" sz="2400" b="1" dirty="0">
               <a:solidFill>
@@ -9187,15 +12800,7 @@
                   <a:schemeClr val="tx1"/>
                 </a:solidFill>
               </a:rPr>
-              <a:t>m</a:t>
-            </a:r>
-            <a:r>
-              <a:rPr lang="en-US" sz="2400" b="1" dirty="0" smtClean="0">
-                <a:solidFill>
-                  <a:schemeClr val="tx1"/>
-                </a:solidFill>
-              </a:rPr>
-              <a:t>iddleware</a:t>
+              <a:t>middleware</a:t>
             </a:r>
             <a:endParaRPr lang="ru-RU" sz="2400" b="1" dirty="0">
               <a:solidFill>

</xml_diff>